<commit_message>
Updates to slide deck and notebook.
</commit_message>
<xml_diff>
--- a/Installing Anaconda and Geopandas.pptx
+++ b/Installing Anaconda and Geopandas.pptx
@@ -246,7 +246,7 @@
           <a:p>
             <a:fld id="{97DB9F38-7D6E-4546-A2F3-30228015AC1A}" type="datetimeFigureOut">
               <a:rPr lang="en-US" smtClean="0"/>
-              <a:t>9/9/2019</a:t>
+              <a:t>10/21/2019</a:t>
             </a:fld>
             <a:endParaRPr lang="en-US"/>
           </a:p>
@@ -416,7 +416,7 @@
           <a:p>
             <a:fld id="{97DB9F38-7D6E-4546-A2F3-30228015AC1A}" type="datetimeFigureOut">
               <a:rPr lang="en-US" smtClean="0"/>
-              <a:t>9/9/2019</a:t>
+              <a:t>10/21/2019</a:t>
             </a:fld>
             <a:endParaRPr lang="en-US"/>
           </a:p>
@@ -596,7 +596,7 @@
           <a:p>
             <a:fld id="{97DB9F38-7D6E-4546-A2F3-30228015AC1A}" type="datetimeFigureOut">
               <a:rPr lang="en-US" smtClean="0"/>
-              <a:t>9/9/2019</a:t>
+              <a:t>10/21/2019</a:t>
             </a:fld>
             <a:endParaRPr lang="en-US"/>
           </a:p>
@@ -766,7 +766,7 @@
           <a:p>
             <a:fld id="{97DB9F38-7D6E-4546-A2F3-30228015AC1A}" type="datetimeFigureOut">
               <a:rPr lang="en-US" smtClean="0"/>
-              <a:t>9/9/2019</a:t>
+              <a:t>10/21/2019</a:t>
             </a:fld>
             <a:endParaRPr lang="en-US"/>
           </a:p>
@@ -1012,7 +1012,7 @@
           <a:p>
             <a:fld id="{97DB9F38-7D6E-4546-A2F3-30228015AC1A}" type="datetimeFigureOut">
               <a:rPr lang="en-US" smtClean="0"/>
-              <a:t>9/9/2019</a:t>
+              <a:t>10/21/2019</a:t>
             </a:fld>
             <a:endParaRPr lang="en-US"/>
           </a:p>
@@ -1244,7 +1244,7 @@
           <a:p>
             <a:fld id="{97DB9F38-7D6E-4546-A2F3-30228015AC1A}" type="datetimeFigureOut">
               <a:rPr lang="en-US" smtClean="0"/>
-              <a:t>9/9/2019</a:t>
+              <a:t>10/21/2019</a:t>
             </a:fld>
             <a:endParaRPr lang="en-US"/>
           </a:p>
@@ -1611,7 +1611,7 @@
           <a:p>
             <a:fld id="{97DB9F38-7D6E-4546-A2F3-30228015AC1A}" type="datetimeFigureOut">
               <a:rPr lang="en-US" smtClean="0"/>
-              <a:t>9/9/2019</a:t>
+              <a:t>10/21/2019</a:t>
             </a:fld>
             <a:endParaRPr lang="en-US"/>
           </a:p>
@@ -1729,7 +1729,7 @@
           <a:p>
             <a:fld id="{97DB9F38-7D6E-4546-A2F3-30228015AC1A}" type="datetimeFigureOut">
               <a:rPr lang="en-US" smtClean="0"/>
-              <a:t>9/9/2019</a:t>
+              <a:t>10/21/2019</a:t>
             </a:fld>
             <a:endParaRPr lang="en-US"/>
           </a:p>
@@ -1824,7 +1824,7 @@
           <a:p>
             <a:fld id="{97DB9F38-7D6E-4546-A2F3-30228015AC1A}" type="datetimeFigureOut">
               <a:rPr lang="en-US" smtClean="0"/>
-              <a:t>9/9/2019</a:t>
+              <a:t>10/21/2019</a:t>
             </a:fld>
             <a:endParaRPr lang="en-US"/>
           </a:p>
@@ -2101,7 +2101,7 @@
           <a:p>
             <a:fld id="{97DB9F38-7D6E-4546-A2F3-30228015AC1A}" type="datetimeFigureOut">
               <a:rPr lang="en-US" smtClean="0"/>
-              <a:t>9/9/2019</a:t>
+              <a:t>10/21/2019</a:t>
             </a:fld>
             <a:endParaRPr lang="en-US"/>
           </a:p>
@@ -2354,7 +2354,7 @@
           <a:p>
             <a:fld id="{97DB9F38-7D6E-4546-A2F3-30228015AC1A}" type="datetimeFigureOut">
               <a:rPr lang="en-US" smtClean="0"/>
-              <a:t>9/9/2019</a:t>
+              <a:t>10/21/2019</a:t>
             </a:fld>
             <a:endParaRPr lang="en-US"/>
           </a:p>
@@ -2567,7 +2567,7 @@
           <a:p>
             <a:fld id="{97DB9F38-7D6E-4546-A2F3-30228015AC1A}" type="datetimeFigureOut">
               <a:rPr lang="en-US" smtClean="0"/>
-              <a:t>9/9/2019</a:t>
+              <a:t>10/21/2019</a:t>
             </a:fld>
             <a:endParaRPr lang="en-US"/>
           </a:p>
@@ -2991,7 +2991,7 @@
           <a:p>
             <a:r>
               <a:rPr lang="en-US" dirty="0" smtClean="0"/>
-              <a:t>September 9, </a:t>
+              <a:t>October 21, </a:t>
             </a:r>
             <a:r>
               <a:rPr lang="en-US" dirty="0" smtClean="0"/>
@@ -3168,39 +3168,20 @@
               <a:rPr lang="en-US" dirty="0" smtClean="0">
                 <a:hlinkClick r:id="rId2"/>
               </a:rPr>
-              <a:t>https</a:t>
-            </a:r>
-            <a:r>
-              <a:rPr lang="en-US" dirty="0" smtClean="0">
-                <a:hlinkClick r:id="rId2"/>
-              </a:rPr>
-              <a:t>://www.anaconda.com/distribution/</a:t>
+              <a:t>https://www.anaconda.com/distribution/</a:t>
             </a:r>
             <a:endParaRPr lang="en-US" dirty="0" smtClean="0"/>
           </a:p>
           <a:p>
             <a:r>
               <a:rPr lang="en-US" dirty="0" smtClean="0"/>
-              <a:t>Make </a:t>
-            </a:r>
+              <a:t>Make sure to select the Python 3.764-bit, graphical installer version</a:t>
+            </a:r>
+          </a:p>
+          <a:p>
             <a:r>
               <a:rPr lang="en-US" dirty="0" smtClean="0"/>
-              <a:t>sure to select the </a:t>
-            </a:r>
-            <a:r>
-              <a:rPr lang="en-US" dirty="0" smtClean="0"/>
-              <a:t>Python 3.764-bit, graphical installer version</a:t>
-            </a:r>
-            <a:endParaRPr lang="en-US" dirty="0" smtClean="0"/>
-          </a:p>
-          <a:p>
-            <a:r>
-              <a:rPr lang="en-US" dirty="0" smtClean="0"/>
-              <a:t>Download and install, accept all </a:t>
-            </a:r>
-            <a:r>
-              <a:rPr lang="en-US" dirty="0" smtClean="0"/>
-              <a:t>defaults.</a:t>
+              <a:t>Download and install, accept all defaults.</a:t>
             </a:r>
           </a:p>
           <a:p>
@@ -3208,7 +3189,6 @@
               <a:rPr lang="en-US" dirty="0" smtClean="0"/>
               <a:t>It will take several minutes</a:t>
             </a:r>
-            <a:endParaRPr lang="en-US" dirty="0" smtClean="0"/>
           </a:p>
           <a:p>
             <a:pPr lvl="1"/>
@@ -3278,11 +3258,7 @@
             </a:r>
             <a:r>
               <a:rPr lang="en-US" dirty="0" smtClean="0"/>
-              <a:t> </a:t>
-            </a:r>
-            <a:r>
-              <a:rPr lang="en-US" dirty="0" smtClean="0"/>
-              <a:t>Part 1</a:t>
+              <a:t> Part 1</a:t>
             </a:r>
             <a:endParaRPr lang="en-US" dirty="0"/>
           </a:p>
@@ -3459,11 +3435,7 @@
             </a:r>
             <a:r>
               <a:rPr lang="en-US" dirty="0" smtClean="0"/>
-              <a:t> </a:t>
-            </a:r>
-            <a:r>
-              <a:rPr lang="en-US" dirty="0" smtClean="0"/>
-              <a:t>Part 2</a:t>
+              <a:t> Part 2</a:t>
             </a:r>
             <a:endParaRPr lang="en-US" dirty="0"/>
           </a:p>

</xml_diff>

<commit_message>
Updates to notebooks and slidedeck.
</commit_message>
<xml_diff>
--- a/Installing Anaconda and Geopandas.pptx
+++ b/Installing Anaconda and Geopandas.pptx
@@ -4,11 +4,20 @@
   <p:sldMasterIdLst>
     <p:sldMasterId id="2147483648" r:id="rId1"/>
   </p:sldMasterIdLst>
+  <p:notesMasterIdLst>
+    <p:notesMasterId r:id="rId12"/>
+  </p:notesMasterIdLst>
   <p:sldIdLst>
     <p:sldId id="260" r:id="rId2"/>
     <p:sldId id="257" r:id="rId3"/>
-    <p:sldId id="258" r:id="rId4"/>
-    <p:sldId id="259" r:id="rId5"/>
+    <p:sldId id="261" r:id="rId4"/>
+    <p:sldId id="268" r:id="rId5"/>
+    <p:sldId id="263" r:id="rId6"/>
+    <p:sldId id="269" r:id="rId7"/>
+    <p:sldId id="264" r:id="rId8"/>
+    <p:sldId id="270" r:id="rId9"/>
+    <p:sldId id="271" r:id="rId10"/>
+    <p:sldId id="272" r:id="rId11"/>
   </p:sldIdLst>
   <p:sldSz cx="12192000" cy="6858000"/>
   <p:notesSz cx="6858000" cy="9144000"/>
@@ -115,6 +124,485 @@
 </p:presentation>
 </file>
 
+<file path=ppt/notesMasters/notesMaster1.xml><?xml version="1.0" encoding="utf-8"?>
+<p:notesMaster xmlns:a="http://schemas.openxmlformats.org/drawingml/2006/main" xmlns:r="http://schemas.openxmlformats.org/officeDocument/2006/relationships" xmlns:p="http://schemas.openxmlformats.org/presentationml/2006/main">
+  <p:cSld>
+    <p:bg>
+      <p:bgRef idx="1001">
+        <a:schemeClr val="bg1"/>
+      </p:bgRef>
+    </p:bg>
+    <p:spTree>
+      <p:nvGrpSpPr>
+        <p:cNvPr id="1" name=""/>
+        <p:cNvGrpSpPr/>
+        <p:nvPr/>
+      </p:nvGrpSpPr>
+      <p:grpSpPr>
+        <a:xfrm>
+          <a:off x="0" y="0"/>
+          <a:ext cx="0" cy="0"/>
+          <a:chOff x="0" y="0"/>
+          <a:chExt cx="0" cy="0"/>
+        </a:xfrm>
+      </p:grpSpPr>
+      <p:sp>
+        <p:nvSpPr>
+          <p:cNvPr id="2" name="Header Placeholder 1"/>
+          <p:cNvSpPr>
+            <a:spLocks noGrp="1"/>
+          </p:cNvSpPr>
+          <p:nvPr>
+            <p:ph type="hdr" sz="quarter"/>
+          </p:nvPr>
+        </p:nvSpPr>
+        <p:spPr>
+          <a:xfrm>
+            <a:off x="0" y="0"/>
+            <a:ext cx="2971800" cy="458788"/>
+          </a:xfrm>
+          <a:prstGeom prst="rect">
+            <a:avLst/>
+          </a:prstGeom>
+        </p:spPr>
+        <p:txBody>
+          <a:bodyPr vert="horz" lIns="91440" tIns="45720" rIns="91440" bIns="45720" rtlCol="0"/>
+          <a:lstStyle>
+            <a:lvl1pPr algn="l">
+              <a:defRPr sz="1200"/>
+            </a:lvl1pPr>
+          </a:lstStyle>
+          <a:p>
+            <a:endParaRPr lang="en-US"/>
+          </a:p>
+        </p:txBody>
+      </p:sp>
+      <p:sp>
+        <p:nvSpPr>
+          <p:cNvPr id="3" name="Date Placeholder 2"/>
+          <p:cNvSpPr>
+            <a:spLocks noGrp="1"/>
+          </p:cNvSpPr>
+          <p:nvPr>
+            <p:ph type="dt" idx="1"/>
+          </p:nvPr>
+        </p:nvSpPr>
+        <p:spPr>
+          <a:xfrm>
+            <a:off x="3884613" y="0"/>
+            <a:ext cx="2971800" cy="458788"/>
+          </a:xfrm>
+          <a:prstGeom prst="rect">
+            <a:avLst/>
+          </a:prstGeom>
+        </p:spPr>
+        <p:txBody>
+          <a:bodyPr vert="horz" lIns="91440" tIns="45720" rIns="91440" bIns="45720" rtlCol="0"/>
+          <a:lstStyle>
+            <a:lvl1pPr algn="r">
+              <a:defRPr sz="1200"/>
+            </a:lvl1pPr>
+          </a:lstStyle>
+          <a:p>
+            <a:fld id="{0EB23849-656F-42CC-8750-7FDDA5785496}" type="datetimeFigureOut">
+              <a:rPr lang="en-US" smtClean="0"/>
+              <a:t>1/22/2020</a:t>
+            </a:fld>
+            <a:endParaRPr lang="en-US"/>
+          </a:p>
+        </p:txBody>
+      </p:sp>
+      <p:sp>
+        <p:nvSpPr>
+          <p:cNvPr id="4" name="Slide Image Placeholder 3"/>
+          <p:cNvSpPr>
+            <a:spLocks noGrp="1" noRot="1" noChangeAspect="1"/>
+          </p:cNvSpPr>
+          <p:nvPr>
+            <p:ph type="sldImg" idx="2"/>
+          </p:nvPr>
+        </p:nvSpPr>
+        <p:spPr>
+          <a:xfrm>
+            <a:off x="685800" y="1143000"/>
+            <a:ext cx="5486400" cy="3086100"/>
+          </a:xfrm>
+          <a:prstGeom prst="rect">
+            <a:avLst/>
+          </a:prstGeom>
+          <a:noFill/>
+          <a:ln w="12700">
+            <a:solidFill>
+              <a:prstClr val="black"/>
+            </a:solidFill>
+          </a:ln>
+        </p:spPr>
+        <p:txBody>
+          <a:bodyPr vert="horz" lIns="91440" tIns="45720" rIns="91440" bIns="45720" rtlCol="0" anchor="ctr"/>
+          <a:lstStyle/>
+          <a:p>
+            <a:endParaRPr lang="en-US"/>
+          </a:p>
+        </p:txBody>
+      </p:sp>
+      <p:sp>
+        <p:nvSpPr>
+          <p:cNvPr id="5" name="Notes Placeholder 4"/>
+          <p:cNvSpPr>
+            <a:spLocks noGrp="1"/>
+          </p:cNvSpPr>
+          <p:nvPr>
+            <p:ph type="body" sz="quarter" idx="3"/>
+          </p:nvPr>
+        </p:nvSpPr>
+        <p:spPr>
+          <a:xfrm>
+            <a:off x="685800" y="4400550"/>
+            <a:ext cx="5486400" cy="3600450"/>
+          </a:xfrm>
+          <a:prstGeom prst="rect">
+            <a:avLst/>
+          </a:prstGeom>
+        </p:spPr>
+        <p:txBody>
+          <a:bodyPr vert="horz" lIns="91440" tIns="45720" rIns="91440" bIns="45720" rtlCol="0"/>
+          <a:lstStyle/>
+          <a:p>
+            <a:pPr lvl="0"/>
+            <a:r>
+              <a:rPr lang="en-US"/>
+              <a:t>Click to edit Master text styles</a:t>
+            </a:r>
+          </a:p>
+          <a:p>
+            <a:pPr lvl="1"/>
+            <a:r>
+              <a:rPr lang="en-US"/>
+              <a:t>Second level</a:t>
+            </a:r>
+          </a:p>
+          <a:p>
+            <a:pPr lvl="2"/>
+            <a:r>
+              <a:rPr lang="en-US"/>
+              <a:t>Third level</a:t>
+            </a:r>
+          </a:p>
+          <a:p>
+            <a:pPr lvl="3"/>
+            <a:r>
+              <a:rPr lang="en-US"/>
+              <a:t>Fourth level</a:t>
+            </a:r>
+          </a:p>
+          <a:p>
+            <a:pPr lvl="4"/>
+            <a:r>
+              <a:rPr lang="en-US"/>
+              <a:t>Fifth level</a:t>
+            </a:r>
+          </a:p>
+        </p:txBody>
+      </p:sp>
+      <p:sp>
+        <p:nvSpPr>
+          <p:cNvPr id="6" name="Footer Placeholder 5"/>
+          <p:cNvSpPr>
+            <a:spLocks noGrp="1"/>
+          </p:cNvSpPr>
+          <p:nvPr>
+            <p:ph type="ftr" sz="quarter" idx="4"/>
+          </p:nvPr>
+        </p:nvSpPr>
+        <p:spPr>
+          <a:xfrm>
+            <a:off x="0" y="8685213"/>
+            <a:ext cx="2971800" cy="458787"/>
+          </a:xfrm>
+          <a:prstGeom prst="rect">
+            <a:avLst/>
+          </a:prstGeom>
+        </p:spPr>
+        <p:txBody>
+          <a:bodyPr vert="horz" lIns="91440" tIns="45720" rIns="91440" bIns="45720" rtlCol="0" anchor="b"/>
+          <a:lstStyle>
+            <a:lvl1pPr algn="l">
+              <a:defRPr sz="1200"/>
+            </a:lvl1pPr>
+          </a:lstStyle>
+          <a:p>
+            <a:endParaRPr lang="en-US"/>
+          </a:p>
+        </p:txBody>
+      </p:sp>
+      <p:sp>
+        <p:nvSpPr>
+          <p:cNvPr id="7" name="Slide Number Placeholder 6"/>
+          <p:cNvSpPr>
+            <a:spLocks noGrp="1"/>
+          </p:cNvSpPr>
+          <p:nvPr>
+            <p:ph type="sldNum" sz="quarter" idx="5"/>
+          </p:nvPr>
+        </p:nvSpPr>
+        <p:spPr>
+          <a:xfrm>
+            <a:off x="3884613" y="8685213"/>
+            <a:ext cx="2971800" cy="458787"/>
+          </a:xfrm>
+          <a:prstGeom prst="rect">
+            <a:avLst/>
+          </a:prstGeom>
+        </p:spPr>
+        <p:txBody>
+          <a:bodyPr vert="horz" lIns="91440" tIns="45720" rIns="91440" bIns="45720" rtlCol="0" anchor="b"/>
+          <a:lstStyle>
+            <a:lvl1pPr algn="r">
+              <a:defRPr sz="1200"/>
+            </a:lvl1pPr>
+          </a:lstStyle>
+          <a:p>
+            <a:fld id="{31BF5B5A-6754-43FC-ACDB-07E1006283FA}" type="slidenum">
+              <a:rPr lang="en-US" smtClean="0"/>
+              <a:t>‹#›</a:t>
+            </a:fld>
+            <a:endParaRPr lang="en-US"/>
+          </a:p>
+        </p:txBody>
+      </p:sp>
+    </p:spTree>
+    <p:extLst>
+      <p:ext uri="{BB962C8B-B14F-4D97-AF65-F5344CB8AC3E}">
+        <p14:creationId xmlns:p14="http://schemas.microsoft.com/office/powerpoint/2010/main" val="2120193905"/>
+      </p:ext>
+    </p:extLst>
+  </p:cSld>
+  <p:clrMap bg1="lt1" tx1="dk1" bg2="lt2" tx2="dk2" accent1="accent1" accent2="accent2" accent3="accent3" accent4="accent4" accent5="accent5" accent6="accent6" hlink="hlink" folHlink="folHlink"/>
+  <p:notesStyle>
+    <a:lvl1pPr marL="0" algn="l" defTabSz="914400" rtl="0" eaLnBrk="1" latinLnBrk="0" hangingPunct="1">
+      <a:defRPr sz="1200" kern="1200">
+        <a:solidFill>
+          <a:schemeClr val="tx1"/>
+        </a:solidFill>
+        <a:latin typeface="+mn-lt"/>
+        <a:ea typeface="+mn-ea"/>
+        <a:cs typeface="+mn-cs"/>
+      </a:defRPr>
+    </a:lvl1pPr>
+    <a:lvl2pPr marL="457200" algn="l" defTabSz="914400" rtl="0" eaLnBrk="1" latinLnBrk="0" hangingPunct="1">
+      <a:defRPr sz="1200" kern="1200">
+        <a:solidFill>
+          <a:schemeClr val="tx1"/>
+        </a:solidFill>
+        <a:latin typeface="+mn-lt"/>
+        <a:ea typeface="+mn-ea"/>
+        <a:cs typeface="+mn-cs"/>
+      </a:defRPr>
+    </a:lvl2pPr>
+    <a:lvl3pPr marL="914400" algn="l" defTabSz="914400" rtl="0" eaLnBrk="1" latinLnBrk="0" hangingPunct="1">
+      <a:defRPr sz="1200" kern="1200">
+        <a:solidFill>
+          <a:schemeClr val="tx1"/>
+        </a:solidFill>
+        <a:latin typeface="+mn-lt"/>
+        <a:ea typeface="+mn-ea"/>
+        <a:cs typeface="+mn-cs"/>
+      </a:defRPr>
+    </a:lvl3pPr>
+    <a:lvl4pPr marL="1371600" algn="l" defTabSz="914400" rtl="0" eaLnBrk="1" latinLnBrk="0" hangingPunct="1">
+      <a:defRPr sz="1200" kern="1200">
+        <a:solidFill>
+          <a:schemeClr val="tx1"/>
+        </a:solidFill>
+        <a:latin typeface="+mn-lt"/>
+        <a:ea typeface="+mn-ea"/>
+        <a:cs typeface="+mn-cs"/>
+      </a:defRPr>
+    </a:lvl4pPr>
+    <a:lvl5pPr marL="1828800" algn="l" defTabSz="914400" rtl="0" eaLnBrk="1" latinLnBrk="0" hangingPunct="1">
+      <a:defRPr sz="1200" kern="1200">
+        <a:solidFill>
+          <a:schemeClr val="tx1"/>
+        </a:solidFill>
+        <a:latin typeface="+mn-lt"/>
+        <a:ea typeface="+mn-ea"/>
+        <a:cs typeface="+mn-cs"/>
+      </a:defRPr>
+    </a:lvl5pPr>
+    <a:lvl6pPr marL="2286000" algn="l" defTabSz="914400" rtl="0" eaLnBrk="1" latinLnBrk="0" hangingPunct="1">
+      <a:defRPr sz="1200" kern="1200">
+        <a:solidFill>
+          <a:schemeClr val="tx1"/>
+        </a:solidFill>
+        <a:latin typeface="+mn-lt"/>
+        <a:ea typeface="+mn-ea"/>
+        <a:cs typeface="+mn-cs"/>
+      </a:defRPr>
+    </a:lvl6pPr>
+    <a:lvl7pPr marL="2743200" algn="l" defTabSz="914400" rtl="0" eaLnBrk="1" latinLnBrk="0" hangingPunct="1">
+      <a:defRPr sz="1200" kern="1200">
+        <a:solidFill>
+          <a:schemeClr val="tx1"/>
+        </a:solidFill>
+        <a:latin typeface="+mn-lt"/>
+        <a:ea typeface="+mn-ea"/>
+        <a:cs typeface="+mn-cs"/>
+      </a:defRPr>
+    </a:lvl7pPr>
+    <a:lvl8pPr marL="3200400" algn="l" defTabSz="914400" rtl="0" eaLnBrk="1" latinLnBrk="0" hangingPunct="1">
+      <a:defRPr sz="1200" kern="1200">
+        <a:solidFill>
+          <a:schemeClr val="tx1"/>
+        </a:solidFill>
+        <a:latin typeface="+mn-lt"/>
+        <a:ea typeface="+mn-ea"/>
+        <a:cs typeface="+mn-cs"/>
+      </a:defRPr>
+    </a:lvl8pPr>
+    <a:lvl9pPr marL="3657600" algn="l" defTabSz="914400" rtl="0" eaLnBrk="1" latinLnBrk="0" hangingPunct="1">
+      <a:defRPr sz="1200" kern="1200">
+        <a:solidFill>
+          <a:schemeClr val="tx1"/>
+        </a:solidFill>
+        <a:latin typeface="+mn-lt"/>
+        <a:ea typeface="+mn-ea"/>
+        <a:cs typeface="+mn-cs"/>
+      </a:defRPr>
+    </a:lvl9pPr>
+  </p:notesStyle>
+</p:notesMaster>
+</file>
+
+<file path=ppt/notesSlides/notesSlide1.xml><?xml version="1.0" encoding="utf-8"?>
+<p:notes xmlns:a="http://schemas.openxmlformats.org/drawingml/2006/main" xmlns:r="http://schemas.openxmlformats.org/officeDocument/2006/relationships" xmlns:p="http://schemas.openxmlformats.org/presentationml/2006/main">
+  <p:cSld>
+    <p:spTree>
+      <p:nvGrpSpPr>
+        <p:cNvPr id="1" name=""/>
+        <p:cNvGrpSpPr/>
+        <p:nvPr/>
+      </p:nvGrpSpPr>
+      <p:grpSpPr>
+        <a:xfrm>
+          <a:off x="0" y="0"/>
+          <a:ext cx="0" cy="0"/>
+          <a:chOff x="0" y="0"/>
+          <a:chExt cx="0" cy="0"/>
+        </a:xfrm>
+      </p:grpSpPr>
+      <p:sp>
+        <p:nvSpPr>
+          <p:cNvPr id="2" name="Slide Image Placeholder 1"/>
+          <p:cNvSpPr>
+            <a:spLocks noGrp="1" noRot="1" noChangeAspect="1"/>
+          </p:cNvSpPr>
+          <p:nvPr>
+            <p:ph type="sldImg"/>
+          </p:nvPr>
+        </p:nvSpPr>
+        <p:spPr/>
+      </p:sp>
+      <p:sp>
+        <p:nvSpPr>
+          <p:cNvPr id="3" name="Notes Placeholder 2"/>
+          <p:cNvSpPr>
+            <a:spLocks noGrp="1"/>
+          </p:cNvSpPr>
+          <p:nvPr>
+            <p:ph type="body" idx="1"/>
+          </p:nvPr>
+        </p:nvSpPr>
+        <p:spPr/>
+        <p:txBody>
+          <a:bodyPr/>
+          <a:lstStyle/>
+          <a:p>
+            <a:r>
+              <a:rPr lang="en-US" dirty="0"/>
+              <a:t>environment: ~ 90 seconds</a:t>
+            </a:r>
+          </a:p>
+          <a:p>
+            <a:r>
+              <a:rPr lang="en-US" dirty="0"/>
+              <a:t>Notebook ~ 80 seconds</a:t>
+            </a:r>
+          </a:p>
+          <a:p>
+            <a:r>
+              <a:rPr lang="en-US" dirty="0"/>
+              <a:t>Matplotlib ~ 80 seconds</a:t>
+            </a:r>
+          </a:p>
+          <a:p>
+            <a:r>
+              <a:rPr lang="en-US" dirty="0"/>
+              <a:t>Descartes ~ 30 seconds</a:t>
+            </a:r>
+          </a:p>
+          <a:p>
+            <a:r>
+              <a:rPr lang="en-US" dirty="0" err="1"/>
+              <a:t>Openpyxl</a:t>
+            </a:r>
+            <a:r>
+              <a:rPr lang="en-US" dirty="0"/>
+              <a:t> ~ 15 seconds</a:t>
+            </a:r>
+          </a:p>
+          <a:p>
+            <a:r>
+              <a:rPr lang="en-US" dirty="0" err="1"/>
+              <a:t>Geopandas</a:t>
+            </a:r>
+            <a:r>
+              <a:rPr lang="en-US" dirty="0"/>
+              <a:t> ~ </a:t>
+            </a:r>
+            <a:r>
+              <a:rPr lang="en-US"/>
+              <a:t>240 seconds</a:t>
+            </a:r>
+            <a:endParaRPr lang="en-US" dirty="0"/>
+          </a:p>
+        </p:txBody>
+      </p:sp>
+      <p:sp>
+        <p:nvSpPr>
+          <p:cNvPr id="4" name="Slide Number Placeholder 3"/>
+          <p:cNvSpPr>
+            <a:spLocks noGrp="1"/>
+          </p:cNvSpPr>
+          <p:nvPr>
+            <p:ph type="sldNum" sz="quarter" idx="5"/>
+          </p:nvPr>
+        </p:nvSpPr>
+        <p:spPr/>
+        <p:txBody>
+          <a:bodyPr/>
+          <a:lstStyle/>
+          <a:p>
+            <a:fld id="{31BF5B5A-6754-43FC-ACDB-07E1006283FA}" type="slidenum">
+              <a:rPr lang="en-US" smtClean="0"/>
+              <a:t>3</a:t>
+            </a:fld>
+            <a:endParaRPr lang="en-US"/>
+          </a:p>
+        </p:txBody>
+      </p:sp>
+    </p:spTree>
+    <p:extLst>
+      <p:ext uri="{BB962C8B-B14F-4D97-AF65-F5344CB8AC3E}">
+        <p14:creationId xmlns:p14="http://schemas.microsoft.com/office/powerpoint/2010/main" val="1412822656"/>
+      </p:ext>
+    </p:extLst>
+  </p:cSld>
+  <p:clrMapOvr>
+    <a:masterClrMapping/>
+  </p:clrMapOvr>
+</p:notes>
+</file>
+
 <file path=ppt/slideLayouts/slideLayout1.xml><?xml version="1.0" encoding="utf-8"?>
 <p:sldLayout xmlns:a="http://schemas.openxmlformats.org/drawingml/2006/main" xmlns:r="http://schemas.openxmlformats.org/officeDocument/2006/relationships" xmlns:p="http://schemas.openxmlformats.org/presentationml/2006/main" type="title" preserve="1">
   <p:cSld name="Title Slide">
@@ -157,10 +645,9 @@
           </a:lstStyle>
           <a:p>
             <a:r>
-              <a:rPr lang="en-US" smtClean="0"/>
+              <a:rPr lang="en-US"/>
               <a:t>Click to edit Master title style</a:t>
             </a:r>
-            <a:endParaRPr lang="en-US"/>
           </a:p>
         </p:txBody>
       </p:sp>
@@ -222,10 +709,9 @@
           </a:lstStyle>
           <a:p>
             <a:r>
-              <a:rPr lang="en-US" smtClean="0"/>
+              <a:rPr lang="en-US"/>
               <a:t>Click to edit Master subtitle style</a:t>
             </a:r>
-            <a:endParaRPr lang="en-US"/>
           </a:p>
         </p:txBody>
       </p:sp>
@@ -246,7 +732,7 @@
           <a:p>
             <a:fld id="{97DB9F38-7D6E-4546-A2F3-30228015AC1A}" type="datetimeFigureOut">
               <a:rPr lang="en-US" smtClean="0"/>
-              <a:t>10/21/2019</a:t>
+              <a:t>1/22/2020</a:t>
             </a:fld>
             <a:endParaRPr lang="en-US"/>
           </a:p>
@@ -340,10 +826,9 @@
           <a:lstStyle/>
           <a:p>
             <a:r>
-              <a:rPr lang="en-US" smtClean="0"/>
+              <a:rPr lang="en-US"/>
               <a:t>Click to edit Master title style</a:t>
             </a:r>
-            <a:endParaRPr lang="en-US"/>
           </a:p>
         </p:txBody>
       </p:sp>
@@ -364,38 +849,37 @@
           <a:p>
             <a:pPr lvl="0"/>
             <a:r>
-              <a:rPr lang="en-US" smtClean="0"/>
+              <a:rPr lang="en-US"/>
               <a:t>Click to edit Master text styles</a:t>
             </a:r>
           </a:p>
           <a:p>
             <a:pPr lvl="1"/>
             <a:r>
-              <a:rPr lang="en-US" smtClean="0"/>
+              <a:rPr lang="en-US"/>
               <a:t>Second level</a:t>
             </a:r>
           </a:p>
           <a:p>
             <a:pPr lvl="2"/>
             <a:r>
-              <a:rPr lang="en-US" smtClean="0"/>
+              <a:rPr lang="en-US"/>
               <a:t>Third level</a:t>
             </a:r>
           </a:p>
           <a:p>
             <a:pPr lvl="3"/>
             <a:r>
-              <a:rPr lang="en-US" smtClean="0"/>
+              <a:rPr lang="en-US"/>
               <a:t>Fourth level</a:t>
             </a:r>
           </a:p>
           <a:p>
             <a:pPr lvl="4"/>
             <a:r>
-              <a:rPr lang="en-US" smtClean="0"/>
+              <a:rPr lang="en-US"/>
               <a:t>Fifth level</a:t>
             </a:r>
-            <a:endParaRPr lang="en-US"/>
           </a:p>
         </p:txBody>
       </p:sp>
@@ -416,7 +900,7 @@
           <a:p>
             <a:fld id="{97DB9F38-7D6E-4546-A2F3-30228015AC1A}" type="datetimeFigureOut">
               <a:rPr lang="en-US" smtClean="0"/>
-              <a:t>10/21/2019</a:t>
+              <a:t>1/22/2020</a:t>
             </a:fld>
             <a:endParaRPr lang="en-US"/>
           </a:p>
@@ -515,10 +999,9 @@
           <a:lstStyle/>
           <a:p>
             <a:r>
-              <a:rPr lang="en-US" smtClean="0"/>
+              <a:rPr lang="en-US"/>
               <a:t>Click to edit Master title style</a:t>
             </a:r>
-            <a:endParaRPr lang="en-US"/>
           </a:p>
         </p:txBody>
       </p:sp>
@@ -544,38 +1027,37 @@
           <a:p>
             <a:pPr lvl="0"/>
             <a:r>
-              <a:rPr lang="en-US" smtClean="0"/>
+              <a:rPr lang="en-US"/>
               <a:t>Click to edit Master text styles</a:t>
             </a:r>
           </a:p>
           <a:p>
             <a:pPr lvl="1"/>
             <a:r>
-              <a:rPr lang="en-US" smtClean="0"/>
+              <a:rPr lang="en-US"/>
               <a:t>Second level</a:t>
             </a:r>
           </a:p>
           <a:p>
             <a:pPr lvl="2"/>
             <a:r>
-              <a:rPr lang="en-US" smtClean="0"/>
+              <a:rPr lang="en-US"/>
               <a:t>Third level</a:t>
             </a:r>
           </a:p>
           <a:p>
             <a:pPr lvl="3"/>
             <a:r>
-              <a:rPr lang="en-US" smtClean="0"/>
+              <a:rPr lang="en-US"/>
               <a:t>Fourth level</a:t>
             </a:r>
           </a:p>
           <a:p>
             <a:pPr lvl="4"/>
             <a:r>
-              <a:rPr lang="en-US" smtClean="0"/>
+              <a:rPr lang="en-US"/>
               <a:t>Fifth level</a:t>
             </a:r>
-            <a:endParaRPr lang="en-US"/>
           </a:p>
         </p:txBody>
       </p:sp>
@@ -596,7 +1078,7 @@
           <a:p>
             <a:fld id="{97DB9F38-7D6E-4546-A2F3-30228015AC1A}" type="datetimeFigureOut">
               <a:rPr lang="en-US" smtClean="0"/>
-              <a:t>10/21/2019</a:t>
+              <a:t>1/22/2020</a:t>
             </a:fld>
             <a:endParaRPr lang="en-US"/>
           </a:p>
@@ -690,10 +1172,9 @@
           <a:lstStyle/>
           <a:p>
             <a:r>
-              <a:rPr lang="en-US" smtClean="0"/>
+              <a:rPr lang="en-US"/>
               <a:t>Click to edit Master title style</a:t>
             </a:r>
-            <a:endParaRPr lang="en-US"/>
           </a:p>
         </p:txBody>
       </p:sp>
@@ -714,38 +1195,37 @@
           <a:p>
             <a:pPr lvl="0"/>
             <a:r>
-              <a:rPr lang="en-US" smtClean="0"/>
+              <a:rPr lang="en-US"/>
               <a:t>Click to edit Master text styles</a:t>
             </a:r>
           </a:p>
           <a:p>
             <a:pPr lvl="1"/>
             <a:r>
-              <a:rPr lang="en-US" smtClean="0"/>
+              <a:rPr lang="en-US"/>
               <a:t>Second level</a:t>
             </a:r>
           </a:p>
           <a:p>
             <a:pPr lvl="2"/>
             <a:r>
-              <a:rPr lang="en-US" smtClean="0"/>
+              <a:rPr lang="en-US"/>
               <a:t>Third level</a:t>
             </a:r>
           </a:p>
           <a:p>
             <a:pPr lvl="3"/>
             <a:r>
-              <a:rPr lang="en-US" smtClean="0"/>
+              <a:rPr lang="en-US"/>
               <a:t>Fourth level</a:t>
             </a:r>
           </a:p>
           <a:p>
             <a:pPr lvl="4"/>
             <a:r>
-              <a:rPr lang="en-US" smtClean="0"/>
+              <a:rPr lang="en-US"/>
               <a:t>Fifth level</a:t>
             </a:r>
-            <a:endParaRPr lang="en-US"/>
           </a:p>
         </p:txBody>
       </p:sp>
@@ -766,7 +1246,7 @@
           <a:p>
             <a:fld id="{97DB9F38-7D6E-4546-A2F3-30228015AC1A}" type="datetimeFigureOut">
               <a:rPr lang="en-US" smtClean="0"/>
-              <a:t>10/21/2019</a:t>
+              <a:t>1/22/2020</a:t>
             </a:fld>
             <a:endParaRPr lang="en-US"/>
           </a:p>
@@ -869,10 +1349,9 @@
           </a:lstStyle>
           <a:p>
             <a:r>
-              <a:rPr lang="en-US" smtClean="0"/>
+              <a:rPr lang="en-US"/>
               <a:t>Click to edit Master title style</a:t>
             </a:r>
-            <a:endParaRPr lang="en-US"/>
           </a:p>
         </p:txBody>
       </p:sp>
@@ -989,7 +1468,7 @@
           <a:p>
             <a:pPr lvl="0"/>
             <a:r>
-              <a:rPr lang="en-US" smtClean="0"/>
+              <a:rPr lang="en-US"/>
               <a:t>Click to edit Master text styles</a:t>
             </a:r>
           </a:p>
@@ -1012,7 +1491,7 @@
           <a:p>
             <a:fld id="{97DB9F38-7D6E-4546-A2F3-30228015AC1A}" type="datetimeFigureOut">
               <a:rPr lang="en-US" smtClean="0"/>
-              <a:t>10/21/2019</a:t>
+              <a:t>1/22/2020</a:t>
             </a:fld>
             <a:endParaRPr lang="en-US"/>
           </a:p>
@@ -1106,10 +1585,9 @@
           <a:lstStyle/>
           <a:p>
             <a:r>
-              <a:rPr lang="en-US" smtClean="0"/>
+              <a:rPr lang="en-US"/>
               <a:t>Click to edit Master title style</a:t>
             </a:r>
-            <a:endParaRPr lang="en-US"/>
           </a:p>
         </p:txBody>
       </p:sp>
@@ -1135,38 +1613,37 @@
           <a:p>
             <a:pPr lvl="0"/>
             <a:r>
-              <a:rPr lang="en-US" smtClean="0"/>
+              <a:rPr lang="en-US"/>
               <a:t>Click to edit Master text styles</a:t>
             </a:r>
           </a:p>
           <a:p>
             <a:pPr lvl="1"/>
             <a:r>
-              <a:rPr lang="en-US" smtClean="0"/>
+              <a:rPr lang="en-US"/>
               <a:t>Second level</a:t>
             </a:r>
           </a:p>
           <a:p>
             <a:pPr lvl="2"/>
             <a:r>
-              <a:rPr lang="en-US" smtClean="0"/>
+              <a:rPr lang="en-US"/>
               <a:t>Third level</a:t>
             </a:r>
           </a:p>
           <a:p>
             <a:pPr lvl="3"/>
             <a:r>
-              <a:rPr lang="en-US" smtClean="0"/>
+              <a:rPr lang="en-US"/>
               <a:t>Fourth level</a:t>
             </a:r>
           </a:p>
           <a:p>
             <a:pPr lvl="4"/>
             <a:r>
-              <a:rPr lang="en-US" smtClean="0"/>
+              <a:rPr lang="en-US"/>
               <a:t>Fifth level</a:t>
             </a:r>
-            <a:endParaRPr lang="en-US"/>
           </a:p>
         </p:txBody>
       </p:sp>
@@ -1192,38 +1669,37 @@
           <a:p>
             <a:pPr lvl="0"/>
             <a:r>
-              <a:rPr lang="en-US" smtClean="0"/>
+              <a:rPr lang="en-US"/>
               <a:t>Click to edit Master text styles</a:t>
             </a:r>
           </a:p>
           <a:p>
             <a:pPr lvl="1"/>
             <a:r>
-              <a:rPr lang="en-US" smtClean="0"/>
+              <a:rPr lang="en-US"/>
               <a:t>Second level</a:t>
             </a:r>
           </a:p>
           <a:p>
             <a:pPr lvl="2"/>
             <a:r>
-              <a:rPr lang="en-US" smtClean="0"/>
+              <a:rPr lang="en-US"/>
               <a:t>Third level</a:t>
             </a:r>
           </a:p>
           <a:p>
             <a:pPr lvl="3"/>
             <a:r>
-              <a:rPr lang="en-US" smtClean="0"/>
+              <a:rPr lang="en-US"/>
               <a:t>Fourth level</a:t>
             </a:r>
           </a:p>
           <a:p>
             <a:pPr lvl="4"/>
             <a:r>
-              <a:rPr lang="en-US" smtClean="0"/>
+              <a:rPr lang="en-US"/>
               <a:t>Fifth level</a:t>
             </a:r>
-            <a:endParaRPr lang="en-US"/>
           </a:p>
         </p:txBody>
       </p:sp>
@@ -1244,7 +1720,7 @@
           <a:p>
             <a:fld id="{97DB9F38-7D6E-4546-A2F3-30228015AC1A}" type="datetimeFigureOut">
               <a:rPr lang="en-US" smtClean="0"/>
-              <a:t>10/21/2019</a:t>
+              <a:t>1/22/2020</a:t>
             </a:fld>
             <a:endParaRPr lang="en-US"/>
           </a:p>
@@ -1343,10 +1819,9 @@
           <a:lstStyle/>
           <a:p>
             <a:r>
-              <a:rPr lang="en-US" smtClean="0"/>
+              <a:rPr lang="en-US"/>
               <a:t>Click to edit Master title style</a:t>
             </a:r>
-            <a:endParaRPr lang="en-US"/>
           </a:p>
         </p:txBody>
       </p:sp>
@@ -1409,7 +1884,7 @@
           <a:p>
             <a:pPr lvl="0"/>
             <a:r>
-              <a:rPr lang="en-US" smtClean="0"/>
+              <a:rPr lang="en-US"/>
               <a:t>Click to edit Master text styles</a:t>
             </a:r>
           </a:p>
@@ -1437,38 +1912,37 @@
           <a:p>
             <a:pPr lvl="0"/>
             <a:r>
-              <a:rPr lang="en-US" smtClean="0"/>
+              <a:rPr lang="en-US"/>
               <a:t>Click to edit Master text styles</a:t>
             </a:r>
           </a:p>
           <a:p>
             <a:pPr lvl="1"/>
             <a:r>
-              <a:rPr lang="en-US" smtClean="0"/>
+              <a:rPr lang="en-US"/>
               <a:t>Second level</a:t>
             </a:r>
           </a:p>
           <a:p>
             <a:pPr lvl="2"/>
             <a:r>
-              <a:rPr lang="en-US" smtClean="0"/>
+              <a:rPr lang="en-US"/>
               <a:t>Third level</a:t>
             </a:r>
           </a:p>
           <a:p>
             <a:pPr lvl="3"/>
             <a:r>
-              <a:rPr lang="en-US" smtClean="0"/>
+              <a:rPr lang="en-US"/>
               <a:t>Fourth level</a:t>
             </a:r>
           </a:p>
           <a:p>
             <a:pPr lvl="4"/>
             <a:r>
-              <a:rPr lang="en-US" smtClean="0"/>
+              <a:rPr lang="en-US"/>
               <a:t>Fifth level</a:t>
             </a:r>
-            <a:endParaRPr lang="en-US"/>
           </a:p>
         </p:txBody>
       </p:sp>
@@ -1531,7 +2005,7 @@
           <a:p>
             <a:pPr lvl="0"/>
             <a:r>
-              <a:rPr lang="en-US" smtClean="0"/>
+              <a:rPr lang="en-US"/>
               <a:t>Click to edit Master text styles</a:t>
             </a:r>
           </a:p>
@@ -1559,38 +2033,37 @@
           <a:p>
             <a:pPr lvl="0"/>
             <a:r>
-              <a:rPr lang="en-US" smtClean="0"/>
+              <a:rPr lang="en-US"/>
               <a:t>Click to edit Master text styles</a:t>
             </a:r>
           </a:p>
           <a:p>
             <a:pPr lvl="1"/>
             <a:r>
-              <a:rPr lang="en-US" smtClean="0"/>
+              <a:rPr lang="en-US"/>
               <a:t>Second level</a:t>
             </a:r>
           </a:p>
           <a:p>
             <a:pPr lvl="2"/>
             <a:r>
-              <a:rPr lang="en-US" smtClean="0"/>
+              <a:rPr lang="en-US"/>
               <a:t>Third level</a:t>
             </a:r>
           </a:p>
           <a:p>
             <a:pPr lvl="3"/>
             <a:r>
-              <a:rPr lang="en-US" smtClean="0"/>
+              <a:rPr lang="en-US"/>
               <a:t>Fourth level</a:t>
             </a:r>
           </a:p>
           <a:p>
             <a:pPr lvl="4"/>
             <a:r>
-              <a:rPr lang="en-US" smtClean="0"/>
+              <a:rPr lang="en-US"/>
               <a:t>Fifth level</a:t>
             </a:r>
-            <a:endParaRPr lang="en-US"/>
           </a:p>
         </p:txBody>
       </p:sp>
@@ -1611,7 +2084,7 @@
           <a:p>
             <a:fld id="{97DB9F38-7D6E-4546-A2F3-30228015AC1A}" type="datetimeFigureOut">
               <a:rPr lang="en-US" smtClean="0"/>
-              <a:t>10/21/2019</a:t>
+              <a:t>1/22/2020</a:t>
             </a:fld>
             <a:endParaRPr lang="en-US"/>
           </a:p>
@@ -1705,10 +2178,9 @@
           <a:lstStyle/>
           <a:p>
             <a:r>
-              <a:rPr lang="en-US" smtClean="0"/>
+              <a:rPr lang="en-US"/>
               <a:t>Click to edit Master title style</a:t>
             </a:r>
-            <a:endParaRPr lang="en-US"/>
           </a:p>
         </p:txBody>
       </p:sp>
@@ -1729,7 +2201,7 @@
           <a:p>
             <a:fld id="{97DB9F38-7D6E-4546-A2F3-30228015AC1A}" type="datetimeFigureOut">
               <a:rPr lang="en-US" smtClean="0"/>
-              <a:t>10/21/2019</a:t>
+              <a:t>1/22/2020</a:t>
             </a:fld>
             <a:endParaRPr lang="en-US"/>
           </a:p>
@@ -1824,7 +2296,7 @@
           <a:p>
             <a:fld id="{97DB9F38-7D6E-4546-A2F3-30228015AC1A}" type="datetimeFigureOut">
               <a:rPr lang="en-US" smtClean="0"/>
-              <a:t>10/21/2019</a:t>
+              <a:t>1/22/2020</a:t>
             </a:fld>
             <a:endParaRPr lang="en-US"/>
           </a:p>
@@ -1927,10 +2399,9 @@
           </a:lstStyle>
           <a:p>
             <a:r>
-              <a:rPr lang="en-US" smtClean="0"/>
+              <a:rPr lang="en-US"/>
               <a:t>Click to edit Master title style</a:t>
             </a:r>
-            <a:endParaRPr lang="en-US"/>
           </a:p>
         </p:txBody>
       </p:sp>
@@ -1984,38 +2455,37 @@
           <a:p>
             <a:pPr lvl="0"/>
             <a:r>
-              <a:rPr lang="en-US" smtClean="0"/>
+              <a:rPr lang="en-US"/>
               <a:t>Click to edit Master text styles</a:t>
             </a:r>
           </a:p>
           <a:p>
             <a:pPr lvl="1"/>
             <a:r>
-              <a:rPr lang="en-US" smtClean="0"/>
+              <a:rPr lang="en-US"/>
               <a:t>Second level</a:t>
             </a:r>
           </a:p>
           <a:p>
             <a:pPr lvl="2"/>
             <a:r>
-              <a:rPr lang="en-US" smtClean="0"/>
+              <a:rPr lang="en-US"/>
               <a:t>Third level</a:t>
             </a:r>
           </a:p>
           <a:p>
             <a:pPr lvl="3"/>
             <a:r>
-              <a:rPr lang="en-US" smtClean="0"/>
+              <a:rPr lang="en-US"/>
               <a:t>Fourth level</a:t>
             </a:r>
           </a:p>
           <a:p>
             <a:pPr lvl="4"/>
             <a:r>
-              <a:rPr lang="en-US" smtClean="0"/>
+              <a:rPr lang="en-US"/>
               <a:t>Fifth level</a:t>
             </a:r>
-            <a:endParaRPr lang="en-US"/>
           </a:p>
         </p:txBody>
       </p:sp>
@@ -2078,7 +2548,7 @@
           <a:p>
             <a:pPr lvl="0"/>
             <a:r>
-              <a:rPr lang="en-US" smtClean="0"/>
+              <a:rPr lang="en-US"/>
               <a:t>Click to edit Master text styles</a:t>
             </a:r>
           </a:p>
@@ -2101,7 +2571,7 @@
           <a:p>
             <a:fld id="{97DB9F38-7D6E-4546-A2F3-30228015AC1A}" type="datetimeFigureOut">
               <a:rPr lang="en-US" smtClean="0"/>
-              <a:t>10/21/2019</a:t>
+              <a:t>1/22/2020</a:t>
             </a:fld>
             <a:endParaRPr lang="en-US"/>
           </a:p>
@@ -2204,10 +2674,9 @@
           </a:lstStyle>
           <a:p>
             <a:r>
-              <a:rPr lang="en-US" smtClean="0"/>
+              <a:rPr lang="en-US"/>
               <a:t>Click to edit Master title style</a:t>
             </a:r>
-            <a:endParaRPr lang="en-US"/>
           </a:p>
         </p:txBody>
       </p:sp>
@@ -2331,7 +2800,7 @@
           <a:p>
             <a:pPr lvl="0"/>
             <a:r>
-              <a:rPr lang="en-US" smtClean="0"/>
+              <a:rPr lang="en-US"/>
               <a:t>Click to edit Master text styles</a:t>
             </a:r>
           </a:p>
@@ -2354,7 +2823,7 @@
           <a:p>
             <a:fld id="{97DB9F38-7D6E-4546-A2F3-30228015AC1A}" type="datetimeFigureOut">
               <a:rPr lang="en-US" smtClean="0"/>
-              <a:t>10/21/2019</a:t>
+              <a:t>1/22/2020</a:t>
             </a:fld>
             <a:endParaRPr lang="en-US"/>
           </a:p>
@@ -2463,10 +2932,9 @@
           <a:lstStyle/>
           <a:p>
             <a:r>
-              <a:rPr lang="en-US" smtClean="0"/>
+              <a:rPr lang="en-US"/>
               <a:t>Click to edit Master title style</a:t>
             </a:r>
-            <a:endParaRPr lang="en-US"/>
           </a:p>
         </p:txBody>
       </p:sp>
@@ -2497,38 +2965,37 @@
           <a:p>
             <a:pPr lvl="0"/>
             <a:r>
-              <a:rPr lang="en-US" smtClean="0"/>
+              <a:rPr lang="en-US"/>
               <a:t>Click to edit Master text styles</a:t>
             </a:r>
           </a:p>
           <a:p>
             <a:pPr lvl="1"/>
             <a:r>
-              <a:rPr lang="en-US" smtClean="0"/>
+              <a:rPr lang="en-US"/>
               <a:t>Second level</a:t>
             </a:r>
           </a:p>
           <a:p>
             <a:pPr lvl="2"/>
             <a:r>
-              <a:rPr lang="en-US" smtClean="0"/>
+              <a:rPr lang="en-US"/>
               <a:t>Third level</a:t>
             </a:r>
           </a:p>
           <a:p>
             <a:pPr lvl="3"/>
             <a:r>
-              <a:rPr lang="en-US" smtClean="0"/>
+              <a:rPr lang="en-US"/>
               <a:t>Fourth level</a:t>
             </a:r>
           </a:p>
           <a:p>
             <a:pPr lvl="4"/>
             <a:r>
-              <a:rPr lang="en-US" smtClean="0"/>
+              <a:rPr lang="en-US"/>
               <a:t>Fifth level</a:t>
             </a:r>
-            <a:endParaRPr lang="en-US"/>
           </a:p>
         </p:txBody>
       </p:sp>
@@ -2567,7 +3034,7 @@
           <a:p>
             <a:fld id="{97DB9F38-7D6E-4546-A2F3-30228015AC1A}" type="datetimeFigureOut">
               <a:rPr lang="en-US" smtClean="0"/>
-              <a:t>10/21/2019</a:t>
+              <a:t>1/22/2020</a:t>
             </a:fld>
             <a:endParaRPr lang="en-US"/>
           </a:p>
@@ -2985,37 +3452,32 @@
         <p:spPr/>
         <p:txBody>
           <a:bodyPr>
-            <a:normAutofit lnSpcReduction="10000"/>
+            <a:normAutofit fontScale="92500" lnSpcReduction="10000"/>
           </a:bodyPr>
           <a:lstStyle/>
           <a:p>
             <a:r>
-              <a:rPr lang="en-US" dirty="0" smtClean="0"/>
-              <a:t>October 21, </a:t>
-            </a:r>
-            <a:r>
-              <a:rPr lang="en-US" dirty="0" smtClean="0"/>
-              <a:t>2019</a:t>
-            </a:r>
-          </a:p>
-          <a:p>
-            <a:r>
-              <a:rPr lang="en-US" dirty="0" smtClean="0"/>
+              <a:rPr lang="en-US" dirty="0"/>
+              <a:t>January 27, 2020</a:t>
+            </a:r>
+          </a:p>
+          <a:p>
+            <a:r>
+              <a:rPr lang="en-US" dirty="0"/>
               <a:t>Mike Babb, Ph.C.</a:t>
             </a:r>
           </a:p>
           <a:p>
             <a:r>
-              <a:rPr lang="en-US" dirty="0" smtClean="0"/>
+              <a:rPr lang="en-US" dirty="0"/>
               <a:t>Center for Social Science Computation and Research</a:t>
             </a:r>
           </a:p>
           <a:p>
             <a:r>
-              <a:rPr lang="en-US" dirty="0" smtClean="0"/>
+              <a:rPr lang="en-US" dirty="0"/>
               <a:t>Department of Geography, UW</a:t>
             </a:r>
-            <a:endParaRPr lang="en-US" dirty="0"/>
           </a:p>
         </p:txBody>
       </p:sp>
@@ -3067,14 +3529,9 @@
           <a:lstStyle/>
           <a:p>
             <a:r>
-              <a:rPr lang="en-US" dirty="0" smtClean="0"/>
-              <a:t>Installing Anaconda and </a:t>
-            </a:r>
-            <a:r>
-              <a:rPr lang="en-US" dirty="0" err="1" smtClean="0"/>
-              <a:t>Geopandas</a:t>
-            </a:r>
-            <a:endParaRPr lang="en-US" dirty="0"/>
+              <a:rPr lang="en-US" dirty="0"/>
+              <a:t>Working with Anaconda python libraries</a:t>
+            </a:r>
           </a:p>
         </p:txBody>
       </p:sp>
@@ -3088,13 +3545,162 @@
   <p:clrMapOvr>
     <a:masterClrMapping/>
   </p:clrMapOvr>
-  <p:timing>
-    <p:tnLst>
-      <p:par>
-        <p:cTn id="1" dur="indefinite" restart="never" nodeType="tmRoot"/>
-      </p:par>
-    </p:tnLst>
-  </p:timing>
+</p:sld>
+</file>
+
+<file path=ppt/slides/slide10.xml><?xml version="1.0" encoding="utf-8"?>
+<p:sld xmlns:a="http://schemas.openxmlformats.org/drawingml/2006/main" xmlns:r="http://schemas.openxmlformats.org/officeDocument/2006/relationships" xmlns:p="http://schemas.openxmlformats.org/presentationml/2006/main">
+  <p:cSld>
+    <p:spTree>
+      <p:nvGrpSpPr>
+        <p:cNvPr id="1" name=""/>
+        <p:cNvGrpSpPr/>
+        <p:nvPr/>
+      </p:nvGrpSpPr>
+      <p:grpSpPr>
+        <a:xfrm>
+          <a:off x="0" y="0"/>
+          <a:ext cx="0" cy="0"/>
+          <a:chOff x="0" y="0"/>
+          <a:chExt cx="0" cy="0"/>
+        </a:xfrm>
+      </p:grpSpPr>
+      <p:sp>
+        <p:nvSpPr>
+          <p:cNvPr id="2" name="Title 1">
+            <a:extLst>
+              <a:ext uri="{FF2B5EF4-FFF2-40B4-BE49-F238E27FC236}">
+                <a16:creationId xmlns:a16="http://schemas.microsoft.com/office/drawing/2014/main" id="{18B3DD71-2E71-4C7F-946F-69EAEBADA8FC}"/>
+              </a:ext>
+            </a:extLst>
+          </p:cNvPr>
+          <p:cNvSpPr>
+            <a:spLocks noGrp="1"/>
+          </p:cNvSpPr>
+          <p:nvPr>
+            <p:ph type="title"/>
+          </p:nvPr>
+        </p:nvSpPr>
+        <p:spPr>
+          <a:xfrm>
+            <a:off x="838200" y="365125"/>
+            <a:ext cx="3873190" cy="1325563"/>
+          </a:xfrm>
+        </p:spPr>
+        <p:txBody>
+          <a:bodyPr>
+            <a:normAutofit/>
+          </a:bodyPr>
+          <a:lstStyle/>
+          <a:p>
+            <a:r>
+              <a:rPr lang="en-US" dirty="0"/>
+              <a:t>Install </a:t>
+            </a:r>
+            <a:r>
+              <a:rPr lang="en-US" dirty="0" err="1"/>
+              <a:t>geopandas</a:t>
+            </a:r>
+            <a:endParaRPr lang="en-US" dirty="0"/>
+          </a:p>
+        </p:txBody>
+      </p:sp>
+      <p:sp>
+        <p:nvSpPr>
+          <p:cNvPr id="3" name="Content Placeholder 2">
+            <a:extLst>
+              <a:ext uri="{FF2B5EF4-FFF2-40B4-BE49-F238E27FC236}">
+                <a16:creationId xmlns:a16="http://schemas.microsoft.com/office/drawing/2014/main" id="{66B8DA7B-6E52-4E18-92F5-84A19E236768}"/>
+              </a:ext>
+            </a:extLst>
+          </p:cNvPr>
+          <p:cNvSpPr>
+            <a:spLocks noGrp="1"/>
+          </p:cNvSpPr>
+          <p:nvPr>
+            <p:ph idx="1"/>
+          </p:nvPr>
+        </p:nvSpPr>
+        <p:spPr>
+          <a:xfrm>
+            <a:off x="4711390" y="505486"/>
+            <a:ext cx="7480610" cy="1185202"/>
+          </a:xfrm>
+        </p:spPr>
+        <p:txBody>
+          <a:bodyPr/>
+          <a:lstStyle/>
+          <a:p>
+            <a:r>
+              <a:rPr lang="en-US" dirty="0" err="1"/>
+              <a:t>conda</a:t>
+            </a:r>
+            <a:r>
+              <a:rPr lang="en-US" dirty="0"/>
+              <a:t> install </a:t>
+            </a:r>
+            <a:r>
+              <a:rPr lang="en-US" dirty="0" err="1"/>
+              <a:t>geopandas</a:t>
+            </a:r>
+            <a:endParaRPr lang="en-US" dirty="0"/>
+          </a:p>
+          <a:p>
+            <a:r>
+              <a:rPr lang="en-US" dirty="0"/>
+              <a:t>Press y to install dependencies when prompted</a:t>
+            </a:r>
+          </a:p>
+          <a:p>
+            <a:endParaRPr lang="en-US" dirty="0"/>
+          </a:p>
+        </p:txBody>
+      </p:sp>
+      <p:pic>
+        <p:nvPicPr>
+          <p:cNvPr id="7" name="Picture 6">
+            <a:extLst>
+              <a:ext uri="{FF2B5EF4-FFF2-40B4-BE49-F238E27FC236}">
+                <a16:creationId xmlns:a16="http://schemas.microsoft.com/office/drawing/2014/main" id="{A2DF7D93-94EA-4ED7-B743-A4369589CA24}"/>
+              </a:ext>
+            </a:extLst>
+          </p:cNvPr>
+          <p:cNvPicPr>
+            <a:picLocks noChangeAspect="1"/>
+          </p:cNvPicPr>
+          <p:nvPr/>
+        </p:nvPicPr>
+        <p:blipFill>
+          <a:blip r:embed="rId2">
+            <a:extLst>
+              <a:ext uri="{28A0092B-C50C-407E-A947-70E740481C1C}">
+                <a14:useLocalDpi xmlns:a14="http://schemas.microsoft.com/office/drawing/2010/main" val="0"/>
+              </a:ext>
+            </a:extLst>
+          </a:blip>
+          <a:srcRect/>
+          <a:stretch/>
+        </p:blipFill>
+        <p:spPr>
+          <a:xfrm>
+            <a:off x="838201" y="2017665"/>
+            <a:ext cx="9326275" cy="4803187"/>
+          </a:xfrm>
+          <a:prstGeom prst="rect">
+            <a:avLst/>
+          </a:prstGeom>
+        </p:spPr>
+      </p:pic>
+    </p:spTree>
+    <p:extLst>
+      <p:ext uri="{BB962C8B-B14F-4D97-AF65-F5344CB8AC3E}">
+        <p14:creationId xmlns:p14="http://schemas.microsoft.com/office/powerpoint/2010/main" val="685335989"/>
+      </p:ext>
+    </p:extLst>
+  </p:cSld>
+  <p:clrMapOvr>
+    <a:masterClrMapping/>
+  </p:clrMapOvr>
 </p:sld>
 </file>
 
@@ -3131,10 +3737,9 @@
           <a:lstStyle/>
           <a:p>
             <a:r>
-              <a:rPr lang="en-US" dirty="0" smtClean="0"/>
-              <a:t>Installing Anaconda</a:t>
-            </a:r>
-            <a:endParaRPr lang="en-US" dirty="0"/>
+              <a:rPr lang="en-US" dirty="0"/>
+              <a:t>Installing Anaconda On Your Computer</a:t>
+            </a:r>
           </a:p>
         </p:txBody>
       </p:sp>
@@ -3155,39 +3760,34 @@
           <a:p>
             <a:r>
               <a:rPr lang="en-US" dirty="0"/>
-              <a:t>If you need to install </a:t>
-            </a:r>
-            <a:r>
-              <a:rPr lang="en-US" dirty="0" smtClean="0"/>
-              <a:t>Anaconda</a:t>
-            </a:r>
-            <a:endParaRPr lang="en-US" dirty="0"/>
-          </a:p>
-          <a:p>
-            <a:r>
-              <a:rPr lang="en-US" dirty="0" smtClean="0">
+              <a:t>If you need to install Anaconda</a:t>
+            </a:r>
+          </a:p>
+          <a:p>
+            <a:r>
+              <a:rPr lang="en-US" dirty="0">
                 <a:hlinkClick r:id="rId2"/>
               </a:rPr>
               <a:t>https://www.anaconda.com/distribution/</a:t>
             </a:r>
-            <a:endParaRPr lang="en-US" dirty="0" smtClean="0"/>
-          </a:p>
-          <a:p>
-            <a:r>
-              <a:rPr lang="en-US" dirty="0" smtClean="0"/>
-              <a:t>Make sure to select the Python 3.764-bit, graphical installer version</a:t>
-            </a:r>
-          </a:p>
-          <a:p>
-            <a:r>
-              <a:rPr lang="en-US" dirty="0" smtClean="0"/>
+            <a:endParaRPr lang="en-US" dirty="0"/>
+          </a:p>
+          <a:p>
+            <a:r>
+              <a:rPr lang="en-US" dirty="0"/>
+              <a:t>Make sure to select the Python 3.7, 64-bit, graphical installer version</a:t>
+            </a:r>
+          </a:p>
+          <a:p>
+            <a:r>
+              <a:rPr lang="en-US" dirty="0"/>
               <a:t>Download and install, accept all defaults.</a:t>
             </a:r>
           </a:p>
           <a:p>
             <a:r>
-              <a:rPr lang="en-US" dirty="0" smtClean="0"/>
-              <a:t>It will take several minutes</a:t>
+              <a:rPr lang="en-US" dirty="0"/>
+              <a:t>It will take 10-15 minutes</a:t>
             </a:r>
           </a:p>
           <a:p>
@@ -3206,13 +3806,6 @@
   <p:clrMapOvr>
     <a:masterClrMapping/>
   </p:clrMapOvr>
-  <p:timing>
-    <p:tnLst>
-      <p:par>
-        <p:cTn id="1" dur="indefinite" restart="never" nodeType="tmRoot"/>
-      </p:par>
-    </p:tnLst>
-  </p:timing>
 </p:sld>
 </file>
 
@@ -3235,7 +3828,13 @@
       </p:grpSpPr>
       <p:sp>
         <p:nvSpPr>
-          <p:cNvPr id="2" name="Title 1"/>
+          <p:cNvPr id="2" name="Title 1">
+            <a:extLst>
+              <a:ext uri="{FF2B5EF4-FFF2-40B4-BE49-F238E27FC236}">
+                <a16:creationId xmlns:a16="http://schemas.microsoft.com/office/drawing/2014/main" id="{F25A7621-203D-48A1-ABEE-757BE65E8F9F}"/>
+              </a:ext>
+            </a:extLst>
+          </p:cNvPr>
           <p:cNvSpPr>
             <a:spLocks noGrp="1"/>
           </p:cNvSpPr>
@@ -3249,147 +3848,139 @@
           <a:lstStyle/>
           <a:p>
             <a:r>
-              <a:rPr lang="en-US" dirty="0" smtClean="0"/>
-              <a:t>Installing </a:t>
-            </a:r>
-            <a:r>
-              <a:rPr lang="en-US" dirty="0" err="1" smtClean="0"/>
-              <a:t>Geopandas</a:t>
-            </a:r>
-            <a:r>
-              <a:rPr lang="en-US" dirty="0" smtClean="0"/>
-              <a:t> Part 1</a:t>
-            </a:r>
+              <a:rPr lang="en-US" dirty="0"/>
+              <a:t>Working with Anaconda</a:t>
+            </a:r>
+          </a:p>
+        </p:txBody>
+      </p:sp>
+      <p:sp>
+        <p:nvSpPr>
+          <p:cNvPr id="3" name="Content Placeholder 2">
+            <a:extLst>
+              <a:ext uri="{FF2B5EF4-FFF2-40B4-BE49-F238E27FC236}">
+                <a16:creationId xmlns:a16="http://schemas.microsoft.com/office/drawing/2014/main" id="{21AEFBB0-8354-41D6-9A38-4B95A348F962}"/>
+              </a:ext>
+            </a:extLst>
+          </p:cNvPr>
+          <p:cNvSpPr>
+            <a:spLocks noGrp="1"/>
+          </p:cNvSpPr>
+          <p:nvPr>
+            <p:ph idx="1"/>
+          </p:nvPr>
+        </p:nvSpPr>
+        <p:spPr/>
+        <p:txBody>
+          <a:bodyPr/>
+          <a:lstStyle/>
+          <a:p>
+            <a:pPr marL="514350" indent="-514350">
+              <a:buAutoNum type="arabicPeriod"/>
+            </a:pPr>
+            <a:r>
+              <a:rPr lang="en-US" dirty="0"/>
+              <a:t>Create a new environment named ‘</a:t>
+            </a:r>
+            <a:r>
+              <a:rPr lang="en-US" dirty="0" err="1"/>
+              <a:t>intro_to_python</a:t>
+            </a:r>
+            <a:r>
+              <a:rPr lang="en-US" dirty="0"/>
+              <a:t>’</a:t>
+            </a:r>
+          </a:p>
+          <a:p>
+            <a:pPr marL="514350" indent="-514350">
+              <a:buAutoNum type="arabicPeriod"/>
+            </a:pPr>
+            <a:r>
+              <a:rPr lang="en-US" dirty="0"/>
+              <a:t>Install </a:t>
+            </a:r>
+            <a:r>
+              <a:rPr lang="en-US" dirty="0" err="1"/>
+              <a:t>jupyter</a:t>
+            </a:r>
+            <a:r>
+              <a:rPr lang="en-US" dirty="0"/>
+              <a:t> notebook – interactive python</a:t>
+            </a:r>
+          </a:p>
+          <a:p>
+            <a:pPr marL="514350" indent="-514350">
+              <a:buAutoNum type="arabicPeriod"/>
+            </a:pPr>
+            <a:r>
+              <a:rPr lang="en-US" dirty="0"/>
+              <a:t>Install matplotlib – graphing and plotting</a:t>
+            </a:r>
+          </a:p>
+          <a:p>
+            <a:pPr marL="514350" indent="-514350">
+              <a:buAutoNum type="arabicPeriod"/>
+            </a:pPr>
+            <a:r>
+              <a:rPr lang="en-US" dirty="0"/>
+              <a:t>Install Descartes – plotting geographic data</a:t>
+            </a:r>
+          </a:p>
+          <a:p>
+            <a:pPr marL="514350" indent="-514350">
+              <a:buAutoNum type="arabicPeriod"/>
+            </a:pPr>
+            <a:r>
+              <a:rPr lang="en-US" dirty="0"/>
+              <a:t>Install </a:t>
+            </a:r>
+            <a:r>
+              <a:rPr lang="en-US" dirty="0" err="1"/>
+              <a:t>openpyxl</a:t>
+            </a:r>
+            <a:r>
+              <a:rPr lang="en-US" dirty="0"/>
+              <a:t> – reading and writing excel files</a:t>
+            </a:r>
+          </a:p>
+          <a:p>
+            <a:pPr marL="514350" indent="-514350">
+              <a:buAutoNum type="arabicPeriod"/>
+            </a:pPr>
+            <a:r>
+              <a:rPr lang="en-US" dirty="0"/>
+              <a:t>Install </a:t>
+            </a:r>
+            <a:r>
+              <a:rPr lang="en-US" dirty="0" err="1"/>
+              <a:t>geopandas</a:t>
+            </a:r>
+            <a:r>
+              <a:rPr lang="en-US" dirty="0"/>
+              <a:t> – working with geographic data</a:t>
+            </a:r>
+          </a:p>
+          <a:p>
+            <a:pPr marL="514350" indent="-514350">
+              <a:buAutoNum type="arabicPeriod"/>
+            </a:pPr>
             <a:endParaRPr lang="en-US" dirty="0"/>
           </a:p>
-        </p:txBody>
-      </p:sp>
-      <p:sp>
-        <p:nvSpPr>
-          <p:cNvPr id="3" name="Content Placeholder 2"/>
-          <p:cNvSpPr>
-            <a:spLocks noGrp="1"/>
-          </p:cNvSpPr>
-          <p:nvPr>
-            <p:ph idx="1"/>
-          </p:nvPr>
-        </p:nvSpPr>
-        <p:spPr/>
-        <p:txBody>
-          <a:bodyPr/>
-          <a:lstStyle/>
-          <a:p>
-            <a:r>
-              <a:rPr lang="en-US" dirty="0" smtClean="0"/>
-              <a:t>Additional packaged needed for spatial data analysis</a:t>
-            </a:r>
-          </a:p>
-          <a:p>
-            <a:r>
-              <a:rPr lang="en-US" dirty="0" smtClean="0"/>
-              <a:t>Installed through the Anaconda Prompt</a:t>
-            </a:r>
-          </a:p>
-          <a:p>
-            <a:r>
-              <a:rPr lang="en-US" dirty="0" smtClean="0"/>
-              <a:t>On a Windows PC: Start Menu </a:t>
-            </a:r>
-            <a:r>
-              <a:rPr lang="en-US" dirty="0" smtClean="0">
-                <a:sym typeface="Wingdings" panose="05000000000000000000" pitchFamily="2" charset="2"/>
-              </a:rPr>
-              <a:t> Anaconda3  Anaconda Prompt</a:t>
-            </a:r>
-          </a:p>
-          <a:p>
-            <a:r>
-              <a:rPr lang="en-US" dirty="0" smtClean="0">
-                <a:sym typeface="Wingdings" panose="05000000000000000000" pitchFamily="2" charset="2"/>
-              </a:rPr>
-              <a:t>Once the prompt opens, enter the following:</a:t>
-            </a:r>
-          </a:p>
-          <a:p>
-            <a:pPr lvl="1"/>
-            <a:r>
-              <a:rPr lang="en-US" dirty="0" err="1" smtClean="0">
-                <a:sym typeface="Wingdings" panose="05000000000000000000" pitchFamily="2" charset="2"/>
-              </a:rPr>
-              <a:t>conda</a:t>
-            </a:r>
-            <a:r>
-              <a:rPr lang="en-US" dirty="0" smtClean="0">
-                <a:sym typeface="Wingdings" panose="05000000000000000000" pitchFamily="2" charset="2"/>
-              </a:rPr>
-              <a:t> install </a:t>
-            </a:r>
-            <a:r>
-              <a:rPr lang="en-US" dirty="0" err="1" smtClean="0">
-                <a:sym typeface="Wingdings" panose="05000000000000000000" pitchFamily="2" charset="2"/>
-              </a:rPr>
-              <a:t>geopandas</a:t>
-            </a:r>
-            <a:endParaRPr lang="en-US" dirty="0" smtClean="0">
-              <a:sym typeface="Wingdings" panose="05000000000000000000" pitchFamily="2" charset="2"/>
-            </a:endParaRPr>
-          </a:p>
-          <a:p>
-            <a:pPr marL="457200" lvl="1" indent="0">
-              <a:buNone/>
-            </a:pPr>
-            <a:endParaRPr lang="en-US" dirty="0" smtClean="0">
-              <a:sym typeface="Wingdings" panose="05000000000000000000" pitchFamily="2" charset="2"/>
-            </a:endParaRPr>
-          </a:p>
-          <a:p>
-            <a:endParaRPr lang="en-US" dirty="0" smtClean="0">
-              <a:sym typeface="Wingdings" panose="05000000000000000000" pitchFamily="2" charset="2"/>
-            </a:endParaRPr>
-          </a:p>
-        </p:txBody>
-      </p:sp>
-      <p:pic>
-        <p:nvPicPr>
-          <p:cNvPr id="4" name="Picture 3"/>
-          <p:cNvPicPr>
-            <a:picLocks noChangeAspect="1"/>
-          </p:cNvPicPr>
-          <p:nvPr/>
-        </p:nvPicPr>
-        <p:blipFill>
-          <a:blip r:embed="rId2"/>
-          <a:stretch>
-            <a:fillRect/>
-          </a:stretch>
-        </p:blipFill>
-        <p:spPr>
-          <a:xfrm>
-            <a:off x="1480466" y="4281084"/>
-            <a:ext cx="4105275" cy="1438275"/>
-          </a:xfrm>
-          <a:prstGeom prst="rect">
-            <a:avLst/>
-          </a:prstGeom>
-        </p:spPr>
-      </p:pic>
+          <a:p>
+            <a:endParaRPr lang="en-US" dirty="0"/>
+          </a:p>
+        </p:txBody>
+      </p:sp>
     </p:spTree>
     <p:extLst>
       <p:ext uri="{BB962C8B-B14F-4D97-AF65-F5344CB8AC3E}">
-        <p14:creationId xmlns:p14="http://schemas.microsoft.com/office/powerpoint/2010/main" val="1223524927"/>
+        <p14:creationId xmlns:p14="http://schemas.microsoft.com/office/powerpoint/2010/main" val="3438320559"/>
       </p:ext>
     </p:extLst>
   </p:cSld>
   <p:clrMapOvr>
     <a:masterClrMapping/>
   </p:clrMapOvr>
-  <p:timing>
-    <p:tnLst>
-      <p:par>
-        <p:cTn id="1" dur="indefinite" restart="never" nodeType="tmRoot"/>
-      </p:par>
-    </p:tnLst>
-  </p:timing>
 </p:sld>
 </file>
 
@@ -3410,146 +4001,525 @@
           <a:chExt cx="0" cy="0"/>
         </a:xfrm>
       </p:grpSpPr>
-      <p:sp>
-        <p:nvSpPr>
-          <p:cNvPr id="2" name="Title 1"/>
-          <p:cNvSpPr>
-            <a:spLocks noGrp="1"/>
-          </p:cNvSpPr>
-          <p:nvPr>
-            <p:ph type="title"/>
-          </p:nvPr>
-        </p:nvSpPr>
-        <p:spPr/>
-        <p:txBody>
-          <a:bodyPr/>
-          <a:lstStyle/>
-          <a:p>
-            <a:r>
-              <a:rPr lang="en-US" dirty="0" smtClean="0"/>
-              <a:t>Installing </a:t>
-            </a:r>
-            <a:r>
-              <a:rPr lang="en-US" dirty="0" err="1" smtClean="0"/>
-              <a:t>Geopandas</a:t>
-            </a:r>
-            <a:r>
-              <a:rPr lang="en-US" dirty="0" smtClean="0"/>
-              <a:t> Part 2</a:t>
-            </a:r>
-            <a:endParaRPr lang="en-US" dirty="0"/>
-          </a:p>
-        </p:txBody>
-      </p:sp>
-      <p:sp>
-        <p:nvSpPr>
-          <p:cNvPr id="3" name="Content Placeholder 2"/>
-          <p:cNvSpPr>
-            <a:spLocks noGrp="1"/>
-          </p:cNvSpPr>
-          <p:nvPr>
-            <p:ph idx="1"/>
-          </p:nvPr>
-        </p:nvSpPr>
-        <p:spPr/>
-        <p:txBody>
-          <a:bodyPr>
-            <a:normAutofit fontScale="92500" lnSpcReduction="20000"/>
-          </a:bodyPr>
-          <a:lstStyle/>
-          <a:p>
-            <a:r>
-              <a:rPr lang="en-US" dirty="0" smtClean="0"/>
-              <a:t>The package will take  several minutes to install</a:t>
-            </a:r>
-          </a:p>
-          <a:p>
-            <a:r>
-              <a:rPr lang="en-US" dirty="0" smtClean="0"/>
-              <a:t>Once complete, enter the following</a:t>
-            </a:r>
-          </a:p>
-          <a:p>
-            <a:r>
-              <a:rPr lang="en-US" dirty="0" smtClean="0"/>
-              <a:t>python (press enter)</a:t>
-            </a:r>
-          </a:p>
-          <a:p>
-            <a:r>
-              <a:rPr lang="en-US" dirty="0" smtClean="0"/>
-              <a:t>import </a:t>
-            </a:r>
-            <a:r>
-              <a:rPr lang="en-US" dirty="0" err="1" smtClean="0"/>
-              <a:t>geopandas</a:t>
-            </a:r>
-            <a:r>
-              <a:rPr lang="en-US" dirty="0" smtClean="0"/>
-              <a:t> (press enter)</a:t>
-            </a:r>
-          </a:p>
-          <a:p>
-            <a:endParaRPr lang="en-US" dirty="0" smtClean="0"/>
-          </a:p>
-          <a:p>
-            <a:endParaRPr lang="en-US" dirty="0" smtClean="0"/>
-          </a:p>
-          <a:p>
-            <a:endParaRPr lang="en-US" dirty="0" smtClean="0"/>
-          </a:p>
-          <a:p>
-            <a:r>
-              <a:rPr lang="en-US" dirty="0" smtClean="0"/>
-              <a:t>if nothing happens, </a:t>
-            </a:r>
-            <a:r>
-              <a:rPr lang="en-US" dirty="0" err="1" smtClean="0"/>
-              <a:t>geopandas</a:t>
-            </a:r>
-            <a:r>
-              <a:rPr lang="en-US" dirty="0" smtClean="0"/>
-              <a:t> was installed successfully</a:t>
-            </a:r>
-          </a:p>
-          <a:p>
-            <a:r>
-              <a:rPr lang="en-US" dirty="0" smtClean="0"/>
-              <a:t>type and enter exit()</a:t>
-            </a:r>
-          </a:p>
-          <a:p>
-            <a:r>
-              <a:rPr lang="en-US" dirty="0" smtClean="0"/>
-              <a:t>type and enter exit</a:t>
-            </a:r>
-          </a:p>
-          <a:p>
-            <a:endParaRPr lang="en-US" dirty="0" smtClean="0"/>
-          </a:p>
-          <a:p>
-            <a:endParaRPr lang="en-US" dirty="0"/>
-          </a:p>
-        </p:txBody>
-      </p:sp>
       <p:pic>
         <p:nvPicPr>
-          <p:cNvPr id="4" name="Picture 3"/>
+          <p:cNvPr id="6" name="Picture 5" descr="A screenshot of a computer&#10;&#10;Description automatically generated">
+            <a:extLst>
+              <a:ext uri="{FF2B5EF4-FFF2-40B4-BE49-F238E27FC236}">
+                <a16:creationId xmlns:a16="http://schemas.microsoft.com/office/drawing/2014/main" id="{AE7C1026-A6A6-45F3-8DF1-406BDE6F0667}"/>
+              </a:ext>
+            </a:extLst>
+          </p:cNvPr>
           <p:cNvPicPr>
             <a:picLocks noChangeAspect="1"/>
           </p:cNvPicPr>
           <p:nvPr/>
         </p:nvPicPr>
         <p:blipFill>
-          <a:blip r:embed="rId2"/>
+          <a:blip r:embed="rId2">
+            <a:extLst>
+              <a:ext uri="{28A0092B-C50C-407E-A947-70E740481C1C}">
+                <a14:useLocalDpi xmlns:a14="http://schemas.microsoft.com/office/drawing/2010/main" val="0"/>
+              </a:ext>
+            </a:extLst>
+          </a:blip>
           <a:stretch>
             <a:fillRect/>
           </a:stretch>
         </p:blipFill>
         <p:spPr>
           <a:xfrm>
-            <a:off x="966989" y="3391694"/>
-            <a:ext cx="7677150" cy="1219200"/>
+            <a:off x="0" y="45998"/>
+            <a:ext cx="12110224" cy="6812001"/>
+          </a:xfrm>
+          <a:prstGeom prst="rect">
+            <a:avLst/>
+          </a:prstGeom>
+        </p:spPr>
+      </p:pic>
+      <p:sp>
+        <p:nvSpPr>
+          <p:cNvPr id="4" name="Title 3">
+            <a:extLst>
+              <a:ext uri="{FF2B5EF4-FFF2-40B4-BE49-F238E27FC236}">
+                <a16:creationId xmlns:a16="http://schemas.microsoft.com/office/drawing/2014/main" id="{A7E02D24-AF05-4483-89DC-269EDDA4B472}"/>
+              </a:ext>
+            </a:extLst>
+          </p:cNvPr>
+          <p:cNvSpPr>
+            <a:spLocks noGrp="1"/>
+          </p:cNvSpPr>
+          <p:nvPr>
+            <p:ph type="title"/>
+          </p:nvPr>
+        </p:nvSpPr>
+        <p:spPr>
+          <a:xfrm>
+            <a:off x="3144640" y="0"/>
+            <a:ext cx="5742878" cy="591127"/>
+          </a:xfrm>
+        </p:spPr>
+        <p:txBody>
+          <a:bodyPr>
+            <a:normAutofit fontScale="90000"/>
+          </a:bodyPr>
+          <a:lstStyle/>
+          <a:p>
+            <a:r>
+              <a:rPr lang="en-US" dirty="0"/>
+              <a:t>Create a new environment</a:t>
+            </a:r>
+          </a:p>
+        </p:txBody>
+      </p:sp>
+      <p:sp>
+        <p:nvSpPr>
+          <p:cNvPr id="7" name="Rectangle 6">
+            <a:extLst>
+              <a:ext uri="{FF2B5EF4-FFF2-40B4-BE49-F238E27FC236}">
+                <a16:creationId xmlns:a16="http://schemas.microsoft.com/office/drawing/2014/main" id="{81E55B26-D828-4512-BAD7-BF0B48AFA648}"/>
+              </a:ext>
+            </a:extLst>
+          </p:cNvPr>
+          <p:cNvSpPr/>
+          <p:nvPr/>
+        </p:nvSpPr>
+        <p:spPr>
+          <a:xfrm>
+            <a:off x="1358534" y="6114699"/>
+            <a:ext cx="468351" cy="390292"/>
+          </a:xfrm>
+          <a:prstGeom prst="rect">
+            <a:avLst/>
+          </a:prstGeom>
+          <a:noFill/>
+          <a:ln w="38100">
+            <a:solidFill>
+              <a:srgbClr val="C00000"/>
+            </a:solidFill>
+          </a:ln>
+        </p:spPr>
+        <p:style>
+          <a:lnRef idx="2">
+            <a:schemeClr val="accent1">
+              <a:shade val="50000"/>
+            </a:schemeClr>
+          </a:lnRef>
+          <a:fillRef idx="1">
+            <a:schemeClr val="accent1"/>
+          </a:fillRef>
+          <a:effectRef idx="0">
+            <a:schemeClr val="accent1"/>
+          </a:effectRef>
+          <a:fontRef idx="minor">
+            <a:schemeClr val="lt1"/>
+          </a:fontRef>
+        </p:style>
+        <p:txBody>
+          <a:bodyPr rtlCol="0" anchor="ctr"/>
+          <a:lstStyle/>
+          <a:p>
+            <a:pPr algn="ctr"/>
+            <a:endParaRPr lang="en-US"/>
+          </a:p>
+        </p:txBody>
+      </p:sp>
+    </p:spTree>
+    <p:extLst>
+      <p:ext uri="{BB962C8B-B14F-4D97-AF65-F5344CB8AC3E}">
+        <p14:creationId xmlns:p14="http://schemas.microsoft.com/office/powerpoint/2010/main" val="363113965"/>
+      </p:ext>
+    </p:extLst>
+  </p:cSld>
+  <p:clrMapOvr>
+    <a:masterClrMapping/>
+  </p:clrMapOvr>
+</p:sld>
+</file>
+
+<file path=ppt/slides/slide5.xml><?xml version="1.0" encoding="utf-8"?>
+<p:sld xmlns:a="http://schemas.openxmlformats.org/drawingml/2006/main" xmlns:r="http://schemas.openxmlformats.org/officeDocument/2006/relationships" xmlns:p="http://schemas.openxmlformats.org/presentationml/2006/main">
+  <p:cSld>
+    <p:spTree>
+      <p:nvGrpSpPr>
+        <p:cNvPr id="1" name=""/>
+        <p:cNvGrpSpPr/>
+        <p:nvPr/>
+      </p:nvGrpSpPr>
+      <p:grpSpPr>
+        <a:xfrm>
+          <a:off x="0" y="0"/>
+          <a:ext cx="0" cy="0"/>
+          <a:chOff x="0" y="0"/>
+          <a:chExt cx="0" cy="0"/>
+        </a:xfrm>
+      </p:grpSpPr>
+      <p:pic>
+        <p:nvPicPr>
+          <p:cNvPr id="5" name="Picture 4" descr="A screenshot of a cell phone&#10;&#10;Description automatically generated">
+            <a:extLst>
+              <a:ext uri="{FF2B5EF4-FFF2-40B4-BE49-F238E27FC236}">
+                <a16:creationId xmlns:a16="http://schemas.microsoft.com/office/drawing/2014/main" id="{C1739C8C-FA1A-4571-9CC3-51EA910EFD5A}"/>
+              </a:ext>
+            </a:extLst>
+          </p:cNvPr>
+          <p:cNvPicPr>
+            <a:picLocks noChangeAspect="1"/>
+          </p:cNvPicPr>
+          <p:nvPr/>
+        </p:nvPicPr>
+        <p:blipFill>
+          <a:blip r:embed="rId2">
+            <a:extLst>
+              <a:ext uri="{28A0092B-C50C-407E-A947-70E740481C1C}">
+                <a14:useLocalDpi xmlns:a14="http://schemas.microsoft.com/office/drawing/2010/main" val="0"/>
+              </a:ext>
+            </a:extLst>
+          </a:blip>
+          <a:stretch>
+            <a:fillRect/>
+          </a:stretch>
+        </p:blipFill>
+        <p:spPr>
+          <a:xfrm>
+            <a:off x="0" y="0"/>
+            <a:ext cx="12192000" cy="6858000"/>
+          </a:xfrm>
+          <a:prstGeom prst="rect">
+            <a:avLst/>
+          </a:prstGeom>
+        </p:spPr>
+      </p:pic>
+      <p:sp>
+        <p:nvSpPr>
+          <p:cNvPr id="2" name="Title 1">
+            <a:extLst>
+              <a:ext uri="{FF2B5EF4-FFF2-40B4-BE49-F238E27FC236}">
+                <a16:creationId xmlns:a16="http://schemas.microsoft.com/office/drawing/2014/main" id="{F5347712-9E1E-47C0-885D-2073891A9B7A}"/>
+              </a:ext>
+            </a:extLst>
+          </p:cNvPr>
+          <p:cNvSpPr>
+            <a:spLocks noGrp="1"/>
+          </p:cNvSpPr>
+          <p:nvPr>
+            <p:ph type="title"/>
+          </p:nvPr>
+        </p:nvSpPr>
+        <p:spPr>
+          <a:xfrm>
+            <a:off x="2767361" y="153254"/>
+            <a:ext cx="8127380" cy="638485"/>
+          </a:xfrm>
+        </p:spPr>
+        <p:txBody>
+          <a:bodyPr>
+            <a:normAutofit fontScale="90000"/>
+          </a:bodyPr>
+          <a:lstStyle/>
+          <a:p>
+            <a:r>
+              <a:rPr lang="en-US" dirty="0"/>
+              <a:t>Install the </a:t>
+            </a:r>
+            <a:r>
+              <a:rPr lang="en-US" dirty="0" err="1"/>
+              <a:t>jupyter</a:t>
+            </a:r>
+            <a:r>
+              <a:rPr lang="en-US" dirty="0"/>
+              <a:t> notebook</a:t>
+            </a:r>
+          </a:p>
+        </p:txBody>
+      </p:sp>
+      <p:sp>
+        <p:nvSpPr>
+          <p:cNvPr id="6" name="Rectangle 5">
+            <a:extLst>
+              <a:ext uri="{FF2B5EF4-FFF2-40B4-BE49-F238E27FC236}">
+                <a16:creationId xmlns:a16="http://schemas.microsoft.com/office/drawing/2014/main" id="{73CC532B-8862-44AA-924B-41056BF5A79A}"/>
+              </a:ext>
+            </a:extLst>
+          </p:cNvPr>
+          <p:cNvSpPr/>
+          <p:nvPr/>
+        </p:nvSpPr>
+        <p:spPr>
+          <a:xfrm>
+            <a:off x="6956446" y="2579763"/>
+            <a:ext cx="468351" cy="390292"/>
+          </a:xfrm>
+          <a:prstGeom prst="rect">
+            <a:avLst/>
+          </a:prstGeom>
+          <a:noFill/>
+          <a:ln w="38100">
+            <a:solidFill>
+              <a:srgbClr val="C00000"/>
+            </a:solidFill>
+          </a:ln>
+        </p:spPr>
+        <p:style>
+          <a:lnRef idx="2">
+            <a:schemeClr val="accent1">
+              <a:shade val="50000"/>
+            </a:schemeClr>
+          </a:lnRef>
+          <a:fillRef idx="1">
+            <a:schemeClr val="accent1"/>
+          </a:fillRef>
+          <a:effectRef idx="0">
+            <a:schemeClr val="accent1"/>
+          </a:effectRef>
+          <a:fontRef idx="minor">
+            <a:schemeClr val="lt1"/>
+          </a:fontRef>
+        </p:style>
+        <p:txBody>
+          <a:bodyPr rtlCol="0" anchor="ctr"/>
+          <a:lstStyle/>
+          <a:p>
+            <a:pPr algn="ctr"/>
+            <a:endParaRPr lang="en-US"/>
+          </a:p>
+        </p:txBody>
+      </p:sp>
+    </p:spTree>
+    <p:extLst>
+      <p:ext uri="{BB962C8B-B14F-4D97-AF65-F5344CB8AC3E}">
+        <p14:creationId xmlns:p14="http://schemas.microsoft.com/office/powerpoint/2010/main" val="1145849357"/>
+      </p:ext>
+    </p:extLst>
+  </p:cSld>
+  <p:clrMapOvr>
+    <a:masterClrMapping/>
+  </p:clrMapOvr>
+</p:sld>
+</file>
+
+<file path=ppt/slides/slide6.xml><?xml version="1.0" encoding="utf-8"?>
+<p:sld xmlns:a="http://schemas.openxmlformats.org/drawingml/2006/main" xmlns:r="http://schemas.openxmlformats.org/officeDocument/2006/relationships" xmlns:p="http://schemas.openxmlformats.org/presentationml/2006/main">
+  <p:cSld>
+    <p:spTree>
+      <p:nvGrpSpPr>
+        <p:cNvPr id="1" name=""/>
+        <p:cNvGrpSpPr/>
+        <p:nvPr/>
+      </p:nvGrpSpPr>
+      <p:grpSpPr>
+        <a:xfrm>
+          <a:off x="0" y="0"/>
+          <a:ext cx="0" cy="0"/>
+          <a:chOff x="0" y="0"/>
+          <a:chExt cx="0" cy="0"/>
+        </a:xfrm>
+      </p:grpSpPr>
+      <p:pic>
+        <p:nvPicPr>
+          <p:cNvPr id="4" name="Picture 3" descr="A screenshot of a computer&#10;&#10;Description automatically generated">
+            <a:extLst>
+              <a:ext uri="{FF2B5EF4-FFF2-40B4-BE49-F238E27FC236}">
+                <a16:creationId xmlns:a16="http://schemas.microsoft.com/office/drawing/2014/main" id="{84C4338A-56F9-4B92-BBAA-24DAD6925649}"/>
+              </a:ext>
+            </a:extLst>
+          </p:cNvPr>
+          <p:cNvPicPr>
+            <a:picLocks noChangeAspect="1"/>
+          </p:cNvPicPr>
+          <p:nvPr/>
+        </p:nvPicPr>
+        <p:blipFill>
+          <a:blip r:embed="rId2">
+            <a:extLst>
+              <a:ext uri="{28A0092B-C50C-407E-A947-70E740481C1C}">
+                <a14:useLocalDpi xmlns:a14="http://schemas.microsoft.com/office/drawing/2010/main" val="0"/>
+              </a:ext>
+            </a:extLst>
+          </a:blip>
+          <a:stretch>
+            <a:fillRect/>
+          </a:stretch>
+        </p:blipFill>
+        <p:spPr>
+          <a:xfrm>
+            <a:off x="0" y="0"/>
+            <a:ext cx="12192000" cy="6858000"/>
+          </a:xfrm>
+          <a:prstGeom prst="rect">
+            <a:avLst/>
+          </a:prstGeom>
+        </p:spPr>
+      </p:pic>
+      <p:sp>
+        <p:nvSpPr>
+          <p:cNvPr id="2" name="Title 1">
+            <a:extLst>
+              <a:ext uri="{FF2B5EF4-FFF2-40B4-BE49-F238E27FC236}">
+                <a16:creationId xmlns:a16="http://schemas.microsoft.com/office/drawing/2014/main" id="{244D1253-6A8B-4ED4-9EE6-FE2728F3FBE2}"/>
+              </a:ext>
+            </a:extLst>
+          </p:cNvPr>
+          <p:cNvSpPr>
+            <a:spLocks noGrp="1"/>
+          </p:cNvSpPr>
+          <p:nvPr>
+            <p:ph type="title"/>
+          </p:nvPr>
+        </p:nvSpPr>
+        <p:spPr>
+          <a:xfrm>
+            <a:off x="3414129" y="153256"/>
+            <a:ext cx="4860073" cy="638485"/>
+          </a:xfrm>
+        </p:spPr>
+        <p:txBody>
+          <a:bodyPr>
+            <a:normAutofit fontScale="90000"/>
+          </a:bodyPr>
+          <a:lstStyle/>
+          <a:p>
+            <a:r>
+              <a:rPr lang="en-US" dirty="0"/>
+              <a:t>Launch the terminal</a:t>
+            </a:r>
+          </a:p>
+        </p:txBody>
+      </p:sp>
+    </p:spTree>
+    <p:extLst>
+      <p:ext uri="{BB962C8B-B14F-4D97-AF65-F5344CB8AC3E}">
+        <p14:creationId xmlns:p14="http://schemas.microsoft.com/office/powerpoint/2010/main" val="2306713827"/>
+      </p:ext>
+    </p:extLst>
+  </p:cSld>
+  <p:clrMapOvr>
+    <a:masterClrMapping/>
+  </p:clrMapOvr>
+</p:sld>
+</file>
+
+<file path=ppt/slides/slide7.xml><?xml version="1.0" encoding="utf-8"?>
+<p:sld xmlns:a="http://schemas.openxmlformats.org/drawingml/2006/main" xmlns:r="http://schemas.openxmlformats.org/officeDocument/2006/relationships" xmlns:p="http://schemas.openxmlformats.org/presentationml/2006/main">
+  <p:cSld>
+    <p:spTree>
+      <p:nvGrpSpPr>
+        <p:cNvPr id="1" name=""/>
+        <p:cNvGrpSpPr/>
+        <p:nvPr/>
+      </p:nvGrpSpPr>
+      <p:grpSpPr>
+        <a:xfrm>
+          <a:off x="0" y="0"/>
+          <a:ext cx="0" cy="0"/>
+          <a:chOff x="0" y="0"/>
+          <a:chExt cx="0" cy="0"/>
+        </a:xfrm>
+      </p:grpSpPr>
+      <p:sp>
+        <p:nvSpPr>
+          <p:cNvPr id="2" name="Title 1">
+            <a:extLst>
+              <a:ext uri="{FF2B5EF4-FFF2-40B4-BE49-F238E27FC236}">
+                <a16:creationId xmlns:a16="http://schemas.microsoft.com/office/drawing/2014/main" id="{18B3DD71-2E71-4C7F-946F-69EAEBADA8FC}"/>
+              </a:ext>
+            </a:extLst>
+          </p:cNvPr>
+          <p:cNvSpPr>
+            <a:spLocks noGrp="1"/>
+          </p:cNvSpPr>
+          <p:nvPr>
+            <p:ph type="title"/>
+          </p:nvPr>
+        </p:nvSpPr>
+        <p:spPr/>
+        <p:txBody>
+          <a:bodyPr/>
+          <a:lstStyle/>
+          <a:p>
+            <a:r>
+              <a:rPr lang="en-US" dirty="0"/>
+              <a:t>Install matplotlib</a:t>
+            </a:r>
+          </a:p>
+        </p:txBody>
+      </p:sp>
+      <p:sp>
+        <p:nvSpPr>
+          <p:cNvPr id="3" name="Content Placeholder 2">
+            <a:extLst>
+              <a:ext uri="{FF2B5EF4-FFF2-40B4-BE49-F238E27FC236}">
+                <a16:creationId xmlns:a16="http://schemas.microsoft.com/office/drawing/2014/main" id="{66B8DA7B-6E52-4E18-92F5-84A19E236768}"/>
+              </a:ext>
+            </a:extLst>
+          </p:cNvPr>
+          <p:cNvSpPr>
+            <a:spLocks noGrp="1"/>
+          </p:cNvSpPr>
+          <p:nvPr>
+            <p:ph idx="1"/>
+          </p:nvPr>
+        </p:nvSpPr>
+        <p:spPr>
+          <a:xfrm>
+            <a:off x="4711390" y="505486"/>
+            <a:ext cx="7480610" cy="1185202"/>
+          </a:xfrm>
+        </p:spPr>
+        <p:txBody>
+          <a:bodyPr/>
+          <a:lstStyle/>
+          <a:p>
+            <a:r>
+              <a:rPr lang="en-US" dirty="0" err="1"/>
+              <a:t>conda</a:t>
+            </a:r>
+            <a:r>
+              <a:rPr lang="en-US" dirty="0"/>
+              <a:t> install matplotlib</a:t>
+            </a:r>
+          </a:p>
+          <a:p>
+            <a:r>
+              <a:rPr lang="en-US" dirty="0"/>
+              <a:t>Press y to install dependencies when prompted</a:t>
+            </a:r>
+          </a:p>
+          <a:p>
+            <a:endParaRPr lang="en-US" dirty="0"/>
+          </a:p>
+        </p:txBody>
+      </p:sp>
+      <p:pic>
+        <p:nvPicPr>
+          <p:cNvPr id="7" name="Picture 6" descr="A screenshot of a computer&#10;&#10;Description automatically generated">
+            <a:extLst>
+              <a:ext uri="{FF2B5EF4-FFF2-40B4-BE49-F238E27FC236}">
+                <a16:creationId xmlns:a16="http://schemas.microsoft.com/office/drawing/2014/main" id="{A2DF7D93-94EA-4ED7-B743-A4369589CA24}"/>
+              </a:ext>
+            </a:extLst>
+          </p:cNvPr>
+          <p:cNvPicPr>
+            <a:picLocks noChangeAspect="1"/>
+          </p:cNvPicPr>
+          <p:nvPr/>
+        </p:nvPicPr>
+        <p:blipFill>
+          <a:blip r:embed="rId2">
+            <a:extLst>
+              <a:ext uri="{28A0092B-C50C-407E-A947-70E740481C1C}">
+                <a14:useLocalDpi xmlns:a14="http://schemas.microsoft.com/office/drawing/2010/main" val="0"/>
+              </a:ext>
+            </a:extLst>
+          </a:blip>
+          <a:stretch>
+            <a:fillRect/>
+          </a:stretch>
+        </p:blipFill>
+        <p:spPr>
+          <a:xfrm>
+            <a:off x="838200" y="1980519"/>
+            <a:ext cx="9326277" cy="4877481"/>
           </a:xfrm>
           <a:prstGeom prst="rect">
             <a:avLst/>
@@ -3559,20 +4529,323 @@
     </p:spTree>
     <p:extLst>
       <p:ext uri="{BB962C8B-B14F-4D97-AF65-F5344CB8AC3E}">
-        <p14:creationId xmlns:p14="http://schemas.microsoft.com/office/powerpoint/2010/main" val="679097631"/>
+        <p14:creationId xmlns:p14="http://schemas.microsoft.com/office/powerpoint/2010/main" val="2590184912"/>
       </p:ext>
     </p:extLst>
   </p:cSld>
   <p:clrMapOvr>
     <a:masterClrMapping/>
   </p:clrMapOvr>
-  <p:timing>
-    <p:tnLst>
-      <p:par>
-        <p:cTn id="1" dur="indefinite" restart="never" nodeType="tmRoot"/>
-      </p:par>
-    </p:tnLst>
-  </p:timing>
+</p:sld>
+</file>
+
+<file path=ppt/slides/slide8.xml><?xml version="1.0" encoding="utf-8"?>
+<p:sld xmlns:a="http://schemas.openxmlformats.org/drawingml/2006/main" xmlns:r="http://schemas.openxmlformats.org/officeDocument/2006/relationships" xmlns:p="http://schemas.openxmlformats.org/presentationml/2006/main">
+  <p:cSld>
+    <p:spTree>
+      <p:nvGrpSpPr>
+        <p:cNvPr id="1" name=""/>
+        <p:cNvGrpSpPr/>
+        <p:nvPr/>
+      </p:nvGrpSpPr>
+      <p:grpSpPr>
+        <a:xfrm>
+          <a:off x="0" y="0"/>
+          <a:ext cx="0" cy="0"/>
+          <a:chOff x="0" y="0"/>
+          <a:chExt cx="0" cy="0"/>
+        </a:xfrm>
+      </p:grpSpPr>
+      <p:sp>
+        <p:nvSpPr>
+          <p:cNvPr id="2" name="Title 1">
+            <a:extLst>
+              <a:ext uri="{FF2B5EF4-FFF2-40B4-BE49-F238E27FC236}">
+                <a16:creationId xmlns:a16="http://schemas.microsoft.com/office/drawing/2014/main" id="{18B3DD71-2E71-4C7F-946F-69EAEBADA8FC}"/>
+              </a:ext>
+            </a:extLst>
+          </p:cNvPr>
+          <p:cNvSpPr>
+            <a:spLocks noGrp="1"/>
+          </p:cNvSpPr>
+          <p:nvPr>
+            <p:ph type="title"/>
+          </p:nvPr>
+        </p:nvSpPr>
+        <p:spPr>
+          <a:xfrm>
+            <a:off x="838200" y="365125"/>
+            <a:ext cx="3873190" cy="1325563"/>
+          </a:xfrm>
+        </p:spPr>
+        <p:txBody>
+          <a:bodyPr/>
+          <a:lstStyle/>
+          <a:p>
+            <a:r>
+              <a:rPr lang="en-US" dirty="0"/>
+              <a:t>Install </a:t>
+            </a:r>
+            <a:r>
+              <a:rPr lang="en-US" dirty="0" err="1"/>
+              <a:t>descartes</a:t>
+            </a:r>
+            <a:endParaRPr lang="en-US" dirty="0"/>
+          </a:p>
+        </p:txBody>
+      </p:sp>
+      <p:sp>
+        <p:nvSpPr>
+          <p:cNvPr id="3" name="Content Placeholder 2">
+            <a:extLst>
+              <a:ext uri="{FF2B5EF4-FFF2-40B4-BE49-F238E27FC236}">
+                <a16:creationId xmlns:a16="http://schemas.microsoft.com/office/drawing/2014/main" id="{66B8DA7B-6E52-4E18-92F5-84A19E236768}"/>
+              </a:ext>
+            </a:extLst>
+          </p:cNvPr>
+          <p:cNvSpPr>
+            <a:spLocks noGrp="1"/>
+          </p:cNvSpPr>
+          <p:nvPr>
+            <p:ph idx="1"/>
+          </p:nvPr>
+        </p:nvSpPr>
+        <p:spPr>
+          <a:xfrm>
+            <a:off x="4711390" y="505486"/>
+            <a:ext cx="7480610" cy="1185202"/>
+          </a:xfrm>
+        </p:spPr>
+        <p:txBody>
+          <a:bodyPr/>
+          <a:lstStyle/>
+          <a:p>
+            <a:r>
+              <a:rPr lang="en-US" dirty="0" err="1"/>
+              <a:t>conda</a:t>
+            </a:r>
+            <a:r>
+              <a:rPr lang="en-US" dirty="0"/>
+              <a:t> install </a:t>
+            </a:r>
+            <a:r>
+              <a:rPr lang="en-US" dirty="0" err="1"/>
+              <a:t>descartes</a:t>
+            </a:r>
+            <a:endParaRPr lang="en-US" dirty="0"/>
+          </a:p>
+          <a:p>
+            <a:r>
+              <a:rPr lang="en-US" dirty="0"/>
+              <a:t>Press y to install dependencies when prompted</a:t>
+            </a:r>
+          </a:p>
+          <a:p>
+            <a:endParaRPr lang="en-US" dirty="0"/>
+          </a:p>
+        </p:txBody>
+      </p:sp>
+      <p:pic>
+        <p:nvPicPr>
+          <p:cNvPr id="7" name="Picture 6">
+            <a:extLst>
+              <a:ext uri="{FF2B5EF4-FFF2-40B4-BE49-F238E27FC236}">
+                <a16:creationId xmlns:a16="http://schemas.microsoft.com/office/drawing/2014/main" id="{A2DF7D93-94EA-4ED7-B743-A4369589CA24}"/>
+              </a:ext>
+            </a:extLst>
+          </p:cNvPr>
+          <p:cNvPicPr>
+            <a:picLocks noChangeAspect="1"/>
+          </p:cNvPicPr>
+          <p:nvPr/>
+        </p:nvPicPr>
+        <p:blipFill>
+          <a:blip r:embed="rId2">
+            <a:extLst>
+              <a:ext uri="{28A0092B-C50C-407E-A947-70E740481C1C}">
+                <a14:useLocalDpi xmlns:a14="http://schemas.microsoft.com/office/drawing/2010/main" val="0"/>
+              </a:ext>
+            </a:extLst>
+          </a:blip>
+          <a:srcRect/>
+          <a:stretch/>
+        </p:blipFill>
+        <p:spPr>
+          <a:xfrm>
+            <a:off x="838200" y="2017665"/>
+            <a:ext cx="9326277" cy="4803188"/>
+          </a:xfrm>
+          <a:prstGeom prst="rect">
+            <a:avLst/>
+          </a:prstGeom>
+        </p:spPr>
+      </p:pic>
+    </p:spTree>
+    <p:extLst>
+      <p:ext uri="{BB962C8B-B14F-4D97-AF65-F5344CB8AC3E}">
+        <p14:creationId xmlns:p14="http://schemas.microsoft.com/office/powerpoint/2010/main" val="4157781941"/>
+      </p:ext>
+    </p:extLst>
+  </p:cSld>
+  <p:clrMapOvr>
+    <a:masterClrMapping/>
+  </p:clrMapOvr>
+</p:sld>
+</file>
+
+<file path=ppt/slides/slide9.xml><?xml version="1.0" encoding="utf-8"?>
+<p:sld xmlns:a="http://schemas.openxmlformats.org/drawingml/2006/main" xmlns:r="http://schemas.openxmlformats.org/officeDocument/2006/relationships" xmlns:p="http://schemas.openxmlformats.org/presentationml/2006/main">
+  <p:cSld>
+    <p:spTree>
+      <p:nvGrpSpPr>
+        <p:cNvPr id="1" name=""/>
+        <p:cNvGrpSpPr/>
+        <p:nvPr/>
+      </p:nvGrpSpPr>
+      <p:grpSpPr>
+        <a:xfrm>
+          <a:off x="0" y="0"/>
+          <a:ext cx="0" cy="0"/>
+          <a:chOff x="0" y="0"/>
+          <a:chExt cx="0" cy="0"/>
+        </a:xfrm>
+      </p:grpSpPr>
+      <p:sp>
+        <p:nvSpPr>
+          <p:cNvPr id="2" name="Title 1">
+            <a:extLst>
+              <a:ext uri="{FF2B5EF4-FFF2-40B4-BE49-F238E27FC236}">
+                <a16:creationId xmlns:a16="http://schemas.microsoft.com/office/drawing/2014/main" id="{18B3DD71-2E71-4C7F-946F-69EAEBADA8FC}"/>
+              </a:ext>
+            </a:extLst>
+          </p:cNvPr>
+          <p:cNvSpPr>
+            <a:spLocks noGrp="1"/>
+          </p:cNvSpPr>
+          <p:nvPr>
+            <p:ph type="title"/>
+          </p:nvPr>
+        </p:nvSpPr>
+        <p:spPr>
+          <a:xfrm>
+            <a:off x="838200" y="365125"/>
+            <a:ext cx="3873190" cy="1325563"/>
+          </a:xfrm>
+        </p:spPr>
+        <p:txBody>
+          <a:bodyPr>
+            <a:normAutofit/>
+          </a:bodyPr>
+          <a:lstStyle/>
+          <a:p>
+            <a:r>
+              <a:rPr lang="en-US" dirty="0"/>
+              <a:t>Install </a:t>
+            </a:r>
+            <a:r>
+              <a:rPr lang="en-US" dirty="0" err="1"/>
+              <a:t>openpyxl</a:t>
+            </a:r>
+            <a:endParaRPr lang="en-US" dirty="0"/>
+          </a:p>
+        </p:txBody>
+      </p:sp>
+      <p:sp>
+        <p:nvSpPr>
+          <p:cNvPr id="3" name="Content Placeholder 2">
+            <a:extLst>
+              <a:ext uri="{FF2B5EF4-FFF2-40B4-BE49-F238E27FC236}">
+                <a16:creationId xmlns:a16="http://schemas.microsoft.com/office/drawing/2014/main" id="{66B8DA7B-6E52-4E18-92F5-84A19E236768}"/>
+              </a:ext>
+            </a:extLst>
+          </p:cNvPr>
+          <p:cNvSpPr>
+            <a:spLocks noGrp="1"/>
+          </p:cNvSpPr>
+          <p:nvPr>
+            <p:ph idx="1"/>
+          </p:nvPr>
+        </p:nvSpPr>
+        <p:spPr>
+          <a:xfrm>
+            <a:off x="4711390" y="505486"/>
+            <a:ext cx="7480610" cy="1185202"/>
+          </a:xfrm>
+        </p:spPr>
+        <p:txBody>
+          <a:bodyPr/>
+          <a:lstStyle/>
+          <a:p>
+            <a:r>
+              <a:rPr lang="en-US" dirty="0" err="1"/>
+              <a:t>conda</a:t>
+            </a:r>
+            <a:r>
+              <a:rPr lang="en-US" dirty="0"/>
+              <a:t> install </a:t>
+            </a:r>
+            <a:r>
+              <a:rPr lang="en-US" dirty="0" err="1"/>
+              <a:t>openpyxl</a:t>
+            </a:r>
+            <a:endParaRPr lang="en-US" dirty="0"/>
+          </a:p>
+          <a:p>
+            <a:r>
+              <a:rPr lang="en-US" dirty="0"/>
+              <a:t>Press y to install dependencies when prompted</a:t>
+            </a:r>
+          </a:p>
+          <a:p>
+            <a:endParaRPr lang="en-US" dirty="0"/>
+          </a:p>
+        </p:txBody>
+      </p:sp>
+      <p:pic>
+        <p:nvPicPr>
+          <p:cNvPr id="7" name="Picture 6">
+            <a:extLst>
+              <a:ext uri="{FF2B5EF4-FFF2-40B4-BE49-F238E27FC236}">
+                <a16:creationId xmlns:a16="http://schemas.microsoft.com/office/drawing/2014/main" id="{A2DF7D93-94EA-4ED7-B743-A4369589CA24}"/>
+              </a:ext>
+            </a:extLst>
+          </p:cNvPr>
+          <p:cNvPicPr>
+            <a:picLocks noChangeAspect="1"/>
+          </p:cNvPicPr>
+          <p:nvPr/>
+        </p:nvPicPr>
+        <p:blipFill>
+          <a:blip r:embed="rId2">
+            <a:extLst>
+              <a:ext uri="{28A0092B-C50C-407E-A947-70E740481C1C}">
+                <a14:useLocalDpi xmlns:a14="http://schemas.microsoft.com/office/drawing/2010/main" val="0"/>
+              </a:ext>
+            </a:extLst>
+          </a:blip>
+          <a:srcRect/>
+          <a:stretch/>
+        </p:blipFill>
+        <p:spPr>
+          <a:xfrm>
+            <a:off x="838201" y="2017665"/>
+            <a:ext cx="9326275" cy="4803188"/>
+          </a:xfrm>
+          <a:prstGeom prst="rect">
+            <a:avLst/>
+          </a:prstGeom>
+        </p:spPr>
+      </p:pic>
+    </p:spTree>
+    <p:extLst>
+      <p:ext uri="{BB962C8B-B14F-4D97-AF65-F5344CB8AC3E}">
+        <p14:creationId xmlns:p14="http://schemas.microsoft.com/office/powerpoint/2010/main" val="346388870"/>
+      </p:ext>
+    </p:extLst>
+  </p:cSld>
+  <p:clrMapOvr>
+    <a:masterClrMapping/>
+  </p:clrMapOvr>
 </p:sld>
 </file>
 
@@ -3835,4 +5108,299 @@
     </a:ext>
   </a:extLst>
 </a:theme>
+</file>
+
+<file path=ppt/theme/theme2.xml><?xml version="1.0" encoding="utf-8"?>
+<a:theme xmlns:a="http://schemas.openxmlformats.org/drawingml/2006/main" name="Office Theme">
+  <a:themeElements>
+    <a:clrScheme name="Office">
+      <a:dk1>
+        <a:sysClr val="windowText" lastClr="000000"/>
+      </a:dk1>
+      <a:lt1>
+        <a:sysClr val="window" lastClr="FFFFFF"/>
+      </a:lt1>
+      <a:dk2>
+        <a:srgbClr val="44546A"/>
+      </a:dk2>
+      <a:lt2>
+        <a:srgbClr val="E7E6E6"/>
+      </a:lt2>
+      <a:accent1>
+        <a:srgbClr val="4472C4"/>
+      </a:accent1>
+      <a:accent2>
+        <a:srgbClr val="ED7D31"/>
+      </a:accent2>
+      <a:accent3>
+        <a:srgbClr val="A5A5A5"/>
+      </a:accent3>
+      <a:accent4>
+        <a:srgbClr val="FFC000"/>
+      </a:accent4>
+      <a:accent5>
+        <a:srgbClr val="5B9BD5"/>
+      </a:accent5>
+      <a:accent6>
+        <a:srgbClr val="70AD47"/>
+      </a:accent6>
+      <a:hlink>
+        <a:srgbClr val="0563C1"/>
+      </a:hlink>
+      <a:folHlink>
+        <a:srgbClr val="954F72"/>
+      </a:folHlink>
+    </a:clrScheme>
+    <a:fontScheme name="Office">
+      <a:majorFont>
+        <a:latin typeface="Calibri Light" panose="020F0302020204030204"/>
+        <a:ea typeface=""/>
+        <a:cs typeface=""/>
+        <a:font script="Jpan" typeface="游ゴシック Light"/>
+        <a:font script="Hang" typeface="맑은 고딕"/>
+        <a:font script="Hans" typeface="等线 Light"/>
+        <a:font script="Hant" typeface="新細明體"/>
+        <a:font script="Arab" typeface="Times New Roman"/>
+        <a:font script="Hebr" typeface="Times New Roman"/>
+        <a:font script="Thai" typeface="Angsana New"/>
+        <a:font script="Ethi" typeface="Nyala"/>
+        <a:font script="Beng" typeface="Vrinda"/>
+        <a:font script="Gujr" typeface="Shruti"/>
+        <a:font script="Khmr" typeface="MoolBoran"/>
+        <a:font script="Knda" typeface="Tunga"/>
+        <a:font script="Guru" typeface="Raavi"/>
+        <a:font script="Cans" typeface="Euphemia"/>
+        <a:font script="Cher" typeface="Plantagenet Cherokee"/>
+        <a:font script="Yiii" typeface="Microsoft Yi Baiti"/>
+        <a:font script="Tibt" typeface="Microsoft Himalaya"/>
+        <a:font script="Thaa" typeface="MV Boli"/>
+        <a:font script="Deva" typeface="Mangal"/>
+        <a:font script="Telu" typeface="Gautami"/>
+        <a:font script="Taml" typeface="Latha"/>
+        <a:font script="Syrc" typeface="Estrangelo Edessa"/>
+        <a:font script="Orya" typeface="Kalinga"/>
+        <a:font script="Mlym" typeface="Kartika"/>
+        <a:font script="Laoo" typeface="DokChampa"/>
+        <a:font script="Sinh" typeface="Iskoola Pota"/>
+        <a:font script="Mong" typeface="Mongolian Baiti"/>
+        <a:font script="Viet" typeface="Times New Roman"/>
+        <a:font script="Uigh" typeface="Microsoft Uighur"/>
+        <a:font script="Geor" typeface="Sylfaen"/>
+        <a:font script="Armn" typeface="Arial"/>
+        <a:font script="Bugi" typeface="Leelawadee UI"/>
+        <a:font script="Bopo" typeface="Microsoft JhengHei"/>
+        <a:font script="Java" typeface="Javanese Text"/>
+        <a:font script="Lisu" typeface="Segoe UI"/>
+        <a:font script="Mymr" typeface="Myanmar Text"/>
+        <a:font script="Nkoo" typeface="Ebrima"/>
+        <a:font script="Olck" typeface="Nirmala UI"/>
+        <a:font script="Osma" typeface="Ebrima"/>
+        <a:font script="Phag" typeface="Phagspa"/>
+        <a:font script="Syrn" typeface="Estrangelo Edessa"/>
+        <a:font script="Syrj" typeface="Estrangelo Edessa"/>
+        <a:font script="Syre" typeface="Estrangelo Edessa"/>
+        <a:font script="Sora" typeface="Nirmala UI"/>
+        <a:font script="Tale" typeface="Microsoft Tai Le"/>
+        <a:font script="Talu" typeface="Microsoft New Tai Lue"/>
+        <a:font script="Tfng" typeface="Ebrima"/>
+      </a:majorFont>
+      <a:minorFont>
+        <a:latin typeface="Calibri" panose="020F0502020204030204"/>
+        <a:ea typeface=""/>
+        <a:cs typeface=""/>
+        <a:font script="Jpan" typeface="游ゴシック"/>
+        <a:font script="Hang" typeface="맑은 고딕"/>
+        <a:font script="Hans" typeface="等线"/>
+        <a:font script="Hant" typeface="新細明體"/>
+        <a:font script="Arab" typeface="Arial"/>
+        <a:font script="Hebr" typeface="Arial"/>
+        <a:font script="Thai" typeface="Cordia New"/>
+        <a:font script="Ethi" typeface="Nyala"/>
+        <a:font script="Beng" typeface="Vrinda"/>
+        <a:font script="Gujr" typeface="Shruti"/>
+        <a:font script="Khmr" typeface="DaunPenh"/>
+        <a:font script="Knda" typeface="Tunga"/>
+        <a:font script="Guru" typeface="Raavi"/>
+        <a:font script="Cans" typeface="Euphemia"/>
+        <a:font script="Cher" typeface="Plantagenet Cherokee"/>
+        <a:font script="Yiii" typeface="Microsoft Yi Baiti"/>
+        <a:font script="Tibt" typeface="Microsoft Himalaya"/>
+        <a:font script="Thaa" typeface="MV Boli"/>
+        <a:font script="Deva" typeface="Mangal"/>
+        <a:font script="Telu" typeface="Gautami"/>
+        <a:font script="Taml" typeface="Latha"/>
+        <a:font script="Syrc" typeface="Estrangelo Edessa"/>
+        <a:font script="Orya" typeface="Kalinga"/>
+        <a:font script="Mlym" typeface="Kartika"/>
+        <a:font script="Laoo" typeface="DokChampa"/>
+        <a:font script="Sinh" typeface="Iskoola Pota"/>
+        <a:font script="Mong" typeface="Mongolian Baiti"/>
+        <a:font script="Viet" typeface="Arial"/>
+        <a:font script="Uigh" typeface="Microsoft Uighur"/>
+        <a:font script="Geor" typeface="Sylfaen"/>
+        <a:font script="Armn" typeface="Arial"/>
+        <a:font script="Bugi" typeface="Leelawadee UI"/>
+        <a:font script="Bopo" typeface="Microsoft JhengHei"/>
+        <a:font script="Java" typeface="Javanese Text"/>
+        <a:font script="Lisu" typeface="Segoe UI"/>
+        <a:font script="Mymr" typeface="Myanmar Text"/>
+        <a:font script="Nkoo" typeface="Ebrima"/>
+        <a:font script="Olck" typeface="Nirmala UI"/>
+        <a:font script="Osma" typeface="Ebrima"/>
+        <a:font script="Phag" typeface="Phagspa"/>
+        <a:font script="Syrn" typeface="Estrangelo Edessa"/>
+        <a:font script="Syrj" typeface="Estrangelo Edessa"/>
+        <a:font script="Syre" typeface="Estrangelo Edessa"/>
+        <a:font script="Sora" typeface="Nirmala UI"/>
+        <a:font script="Tale" typeface="Microsoft Tai Le"/>
+        <a:font script="Talu" typeface="Microsoft New Tai Lue"/>
+        <a:font script="Tfng" typeface="Ebrima"/>
+      </a:minorFont>
+    </a:fontScheme>
+    <a:fmtScheme name="Office">
+      <a:fillStyleLst>
+        <a:solidFill>
+          <a:schemeClr val="phClr"/>
+        </a:solidFill>
+        <a:gradFill rotWithShape="1">
+          <a:gsLst>
+            <a:gs pos="0">
+              <a:schemeClr val="phClr">
+                <a:lumMod val="110000"/>
+                <a:satMod val="105000"/>
+                <a:tint val="67000"/>
+              </a:schemeClr>
+            </a:gs>
+            <a:gs pos="50000">
+              <a:schemeClr val="phClr">
+                <a:lumMod val="105000"/>
+                <a:satMod val="103000"/>
+                <a:tint val="73000"/>
+              </a:schemeClr>
+            </a:gs>
+            <a:gs pos="100000">
+              <a:schemeClr val="phClr">
+                <a:lumMod val="105000"/>
+                <a:satMod val="109000"/>
+                <a:tint val="81000"/>
+              </a:schemeClr>
+            </a:gs>
+          </a:gsLst>
+          <a:lin ang="5400000" scaled="0"/>
+        </a:gradFill>
+        <a:gradFill rotWithShape="1">
+          <a:gsLst>
+            <a:gs pos="0">
+              <a:schemeClr val="phClr">
+                <a:satMod val="103000"/>
+                <a:lumMod val="102000"/>
+                <a:tint val="94000"/>
+              </a:schemeClr>
+            </a:gs>
+            <a:gs pos="50000">
+              <a:schemeClr val="phClr">
+                <a:satMod val="110000"/>
+                <a:lumMod val="100000"/>
+                <a:shade val="100000"/>
+              </a:schemeClr>
+            </a:gs>
+            <a:gs pos="100000">
+              <a:schemeClr val="phClr">
+                <a:lumMod val="99000"/>
+                <a:satMod val="120000"/>
+                <a:shade val="78000"/>
+              </a:schemeClr>
+            </a:gs>
+          </a:gsLst>
+          <a:lin ang="5400000" scaled="0"/>
+        </a:gradFill>
+      </a:fillStyleLst>
+      <a:lnStyleLst>
+        <a:ln w="6350" cap="flat" cmpd="sng" algn="ctr">
+          <a:solidFill>
+            <a:schemeClr val="phClr"/>
+          </a:solidFill>
+          <a:prstDash val="solid"/>
+          <a:miter lim="800000"/>
+        </a:ln>
+        <a:ln w="12700" cap="flat" cmpd="sng" algn="ctr">
+          <a:solidFill>
+            <a:schemeClr val="phClr"/>
+          </a:solidFill>
+          <a:prstDash val="solid"/>
+          <a:miter lim="800000"/>
+        </a:ln>
+        <a:ln w="19050" cap="flat" cmpd="sng" algn="ctr">
+          <a:solidFill>
+            <a:schemeClr val="phClr"/>
+          </a:solidFill>
+          <a:prstDash val="solid"/>
+          <a:miter lim="800000"/>
+        </a:ln>
+      </a:lnStyleLst>
+      <a:effectStyleLst>
+        <a:effectStyle>
+          <a:effectLst/>
+        </a:effectStyle>
+        <a:effectStyle>
+          <a:effectLst/>
+        </a:effectStyle>
+        <a:effectStyle>
+          <a:effectLst>
+            <a:outerShdw blurRad="57150" dist="19050" dir="5400000" algn="ctr" rotWithShape="0">
+              <a:srgbClr val="000000">
+                <a:alpha val="63000"/>
+              </a:srgbClr>
+            </a:outerShdw>
+          </a:effectLst>
+        </a:effectStyle>
+      </a:effectStyleLst>
+      <a:bgFillStyleLst>
+        <a:solidFill>
+          <a:schemeClr val="phClr"/>
+        </a:solidFill>
+        <a:solidFill>
+          <a:schemeClr val="phClr">
+            <a:tint val="95000"/>
+            <a:satMod val="170000"/>
+          </a:schemeClr>
+        </a:solidFill>
+        <a:gradFill rotWithShape="1">
+          <a:gsLst>
+            <a:gs pos="0">
+              <a:schemeClr val="phClr">
+                <a:tint val="93000"/>
+                <a:satMod val="150000"/>
+                <a:shade val="98000"/>
+                <a:lumMod val="102000"/>
+              </a:schemeClr>
+            </a:gs>
+            <a:gs pos="50000">
+              <a:schemeClr val="phClr">
+                <a:tint val="98000"/>
+                <a:satMod val="130000"/>
+                <a:shade val="90000"/>
+                <a:lumMod val="103000"/>
+              </a:schemeClr>
+            </a:gs>
+            <a:gs pos="100000">
+              <a:schemeClr val="phClr">
+                <a:shade val="63000"/>
+                <a:satMod val="120000"/>
+              </a:schemeClr>
+            </a:gs>
+          </a:gsLst>
+          <a:lin ang="5400000" scaled="0"/>
+        </a:gradFill>
+      </a:bgFillStyleLst>
+    </a:fmtScheme>
+  </a:themeElements>
+  <a:objectDefaults/>
+  <a:extraClrSchemeLst/>
+  <a:extLst>
+    <a:ext uri="{05A4C25C-085E-4340-85A3-A5531E510DB2}">
+      <thm15:themeFamily xmlns:thm15="http://schemas.microsoft.com/office/thememl/2012/main" name="Office Theme" id="{62F939B6-93AF-4DB8-9C6B-D6C7DFDC589F}" vid="{4A3C46E8-61CC-4603-A589-7422A47A8E4A}"/>
+    </a:ext>
+  </a:extLst>
+</a:theme>
 </file>
</xml_diff>

<commit_message>
updates to deck and code
</commit_message>
<xml_diff>
--- a/Installing Anaconda and Geopandas.pptx
+++ b/Installing Anaconda and Geopandas.pptx
@@ -206,7 +206,7 @@
           <a:p>
             <a:fld id="{0EB23849-656F-42CC-8750-7FDDA5785496}" type="datetimeFigureOut">
               <a:rPr lang="en-US" smtClean="0"/>
-              <a:t>1/22/2020</a:t>
+              <a:t>1/27/2020</a:t>
             </a:fld>
             <a:endParaRPr lang="en-US"/>
           </a:p>
@@ -732,7 +732,7 @@
           <a:p>
             <a:fld id="{97DB9F38-7D6E-4546-A2F3-30228015AC1A}" type="datetimeFigureOut">
               <a:rPr lang="en-US" smtClean="0"/>
-              <a:t>1/22/2020</a:t>
+              <a:t>1/27/2020</a:t>
             </a:fld>
             <a:endParaRPr lang="en-US"/>
           </a:p>
@@ -900,7 +900,7 @@
           <a:p>
             <a:fld id="{97DB9F38-7D6E-4546-A2F3-30228015AC1A}" type="datetimeFigureOut">
               <a:rPr lang="en-US" smtClean="0"/>
-              <a:t>1/22/2020</a:t>
+              <a:t>1/27/2020</a:t>
             </a:fld>
             <a:endParaRPr lang="en-US"/>
           </a:p>
@@ -1078,7 +1078,7 @@
           <a:p>
             <a:fld id="{97DB9F38-7D6E-4546-A2F3-30228015AC1A}" type="datetimeFigureOut">
               <a:rPr lang="en-US" smtClean="0"/>
-              <a:t>1/22/2020</a:t>
+              <a:t>1/27/2020</a:t>
             </a:fld>
             <a:endParaRPr lang="en-US"/>
           </a:p>
@@ -1246,7 +1246,7 @@
           <a:p>
             <a:fld id="{97DB9F38-7D6E-4546-A2F3-30228015AC1A}" type="datetimeFigureOut">
               <a:rPr lang="en-US" smtClean="0"/>
-              <a:t>1/22/2020</a:t>
+              <a:t>1/27/2020</a:t>
             </a:fld>
             <a:endParaRPr lang="en-US"/>
           </a:p>
@@ -1491,7 +1491,7 @@
           <a:p>
             <a:fld id="{97DB9F38-7D6E-4546-A2F3-30228015AC1A}" type="datetimeFigureOut">
               <a:rPr lang="en-US" smtClean="0"/>
-              <a:t>1/22/2020</a:t>
+              <a:t>1/27/2020</a:t>
             </a:fld>
             <a:endParaRPr lang="en-US"/>
           </a:p>
@@ -1720,7 +1720,7 @@
           <a:p>
             <a:fld id="{97DB9F38-7D6E-4546-A2F3-30228015AC1A}" type="datetimeFigureOut">
               <a:rPr lang="en-US" smtClean="0"/>
-              <a:t>1/22/2020</a:t>
+              <a:t>1/27/2020</a:t>
             </a:fld>
             <a:endParaRPr lang="en-US"/>
           </a:p>
@@ -2084,7 +2084,7 @@
           <a:p>
             <a:fld id="{97DB9F38-7D6E-4546-A2F3-30228015AC1A}" type="datetimeFigureOut">
               <a:rPr lang="en-US" smtClean="0"/>
-              <a:t>1/22/2020</a:t>
+              <a:t>1/27/2020</a:t>
             </a:fld>
             <a:endParaRPr lang="en-US"/>
           </a:p>
@@ -2201,7 +2201,7 @@
           <a:p>
             <a:fld id="{97DB9F38-7D6E-4546-A2F3-30228015AC1A}" type="datetimeFigureOut">
               <a:rPr lang="en-US" smtClean="0"/>
-              <a:t>1/22/2020</a:t>
+              <a:t>1/27/2020</a:t>
             </a:fld>
             <a:endParaRPr lang="en-US"/>
           </a:p>
@@ -2296,7 +2296,7 @@
           <a:p>
             <a:fld id="{97DB9F38-7D6E-4546-A2F3-30228015AC1A}" type="datetimeFigureOut">
               <a:rPr lang="en-US" smtClean="0"/>
-              <a:t>1/22/2020</a:t>
+              <a:t>1/27/2020</a:t>
             </a:fld>
             <a:endParaRPr lang="en-US"/>
           </a:p>
@@ -2571,7 +2571,7 @@
           <a:p>
             <a:fld id="{97DB9F38-7D6E-4546-A2F3-30228015AC1A}" type="datetimeFigureOut">
               <a:rPr lang="en-US" smtClean="0"/>
-              <a:t>1/22/2020</a:t>
+              <a:t>1/27/2020</a:t>
             </a:fld>
             <a:endParaRPr lang="en-US"/>
           </a:p>
@@ -2823,7 +2823,7 @@
           <a:p>
             <a:fld id="{97DB9F38-7D6E-4546-A2F3-30228015AC1A}" type="datetimeFigureOut">
               <a:rPr lang="en-US" smtClean="0"/>
-              <a:t>1/22/2020</a:t>
+              <a:t>1/27/2020</a:t>
             </a:fld>
             <a:endParaRPr lang="en-US"/>
           </a:p>
@@ -3034,7 +3034,7 @@
           <a:p>
             <a:fld id="{97DB9F38-7D6E-4546-A2F3-30228015AC1A}" type="datetimeFigureOut">
               <a:rPr lang="en-US" smtClean="0"/>
-              <a:t>1/22/2020</a:t>
+              <a:t>1/27/2020</a:t>
             </a:fld>
             <a:endParaRPr lang="en-US"/>
           </a:p>
@@ -3530,7 +3530,7 @@
           <a:p>
             <a:r>
               <a:rPr lang="en-US" dirty="0"/>
-              <a:t>Working with Anaconda python libraries</a:t>
+              <a:t>Working with Anaconda and python libraries</a:t>
             </a:r>
           </a:p>
         </p:txBody>
@@ -3683,7 +3683,7 @@
         </p:blipFill>
         <p:spPr>
           <a:xfrm>
-            <a:off x="838201" y="2017665"/>
+            <a:off x="838201" y="2047809"/>
             <a:ext cx="9326275" cy="4803187"/>
           </a:xfrm>
           <a:prstGeom prst="rect">
@@ -4672,7 +4672,7 @@
         </p:blipFill>
         <p:spPr>
           <a:xfrm>
-            <a:off x="838200" y="2017665"/>
+            <a:off x="838200" y="2057857"/>
             <a:ext cx="9326277" cy="4803188"/>
           </a:xfrm>
           <a:prstGeom prst="rect">
@@ -4828,7 +4828,7 @@
         </p:blipFill>
         <p:spPr>
           <a:xfrm>
-            <a:off x="838201" y="2017665"/>
+            <a:off x="838201" y="2047809"/>
             <a:ext cx="9326275" cy="4803188"/>
           </a:xfrm>
           <a:prstGeom prst="rect">

</xml_diff>

<commit_message>
updates to the notebooks.
</commit_message>
<xml_diff>
--- a/Installing Anaconda and Geopandas.pptx
+++ b/Installing Anaconda and Geopandas.pptx
@@ -206,7 +206,7 @@
           <a:p>
             <a:fld id="{0EB23849-656F-42CC-8750-7FDDA5785496}" type="datetimeFigureOut">
               <a:rPr lang="en-US" smtClean="0"/>
-              <a:t>1/27/2020</a:t>
+              <a:t>2/10/2020</a:t>
             </a:fld>
             <a:endParaRPr lang="en-US"/>
           </a:p>
@@ -732,7 +732,7 @@
           <a:p>
             <a:fld id="{97DB9F38-7D6E-4546-A2F3-30228015AC1A}" type="datetimeFigureOut">
               <a:rPr lang="en-US" smtClean="0"/>
-              <a:t>1/27/2020</a:t>
+              <a:t>2/10/2020</a:t>
             </a:fld>
             <a:endParaRPr lang="en-US"/>
           </a:p>
@@ -900,7 +900,7 @@
           <a:p>
             <a:fld id="{97DB9F38-7D6E-4546-A2F3-30228015AC1A}" type="datetimeFigureOut">
               <a:rPr lang="en-US" smtClean="0"/>
-              <a:t>1/27/2020</a:t>
+              <a:t>2/10/2020</a:t>
             </a:fld>
             <a:endParaRPr lang="en-US"/>
           </a:p>
@@ -1078,7 +1078,7 @@
           <a:p>
             <a:fld id="{97DB9F38-7D6E-4546-A2F3-30228015AC1A}" type="datetimeFigureOut">
               <a:rPr lang="en-US" smtClean="0"/>
-              <a:t>1/27/2020</a:t>
+              <a:t>2/10/2020</a:t>
             </a:fld>
             <a:endParaRPr lang="en-US"/>
           </a:p>
@@ -1246,7 +1246,7 @@
           <a:p>
             <a:fld id="{97DB9F38-7D6E-4546-A2F3-30228015AC1A}" type="datetimeFigureOut">
               <a:rPr lang="en-US" smtClean="0"/>
-              <a:t>1/27/2020</a:t>
+              <a:t>2/10/2020</a:t>
             </a:fld>
             <a:endParaRPr lang="en-US"/>
           </a:p>
@@ -1491,7 +1491,7 @@
           <a:p>
             <a:fld id="{97DB9F38-7D6E-4546-A2F3-30228015AC1A}" type="datetimeFigureOut">
               <a:rPr lang="en-US" smtClean="0"/>
-              <a:t>1/27/2020</a:t>
+              <a:t>2/10/2020</a:t>
             </a:fld>
             <a:endParaRPr lang="en-US"/>
           </a:p>
@@ -1720,7 +1720,7 @@
           <a:p>
             <a:fld id="{97DB9F38-7D6E-4546-A2F3-30228015AC1A}" type="datetimeFigureOut">
               <a:rPr lang="en-US" smtClean="0"/>
-              <a:t>1/27/2020</a:t>
+              <a:t>2/10/2020</a:t>
             </a:fld>
             <a:endParaRPr lang="en-US"/>
           </a:p>
@@ -2084,7 +2084,7 @@
           <a:p>
             <a:fld id="{97DB9F38-7D6E-4546-A2F3-30228015AC1A}" type="datetimeFigureOut">
               <a:rPr lang="en-US" smtClean="0"/>
-              <a:t>1/27/2020</a:t>
+              <a:t>2/10/2020</a:t>
             </a:fld>
             <a:endParaRPr lang="en-US"/>
           </a:p>
@@ -2201,7 +2201,7 @@
           <a:p>
             <a:fld id="{97DB9F38-7D6E-4546-A2F3-30228015AC1A}" type="datetimeFigureOut">
               <a:rPr lang="en-US" smtClean="0"/>
-              <a:t>1/27/2020</a:t>
+              <a:t>2/10/2020</a:t>
             </a:fld>
             <a:endParaRPr lang="en-US"/>
           </a:p>
@@ -2296,7 +2296,7 @@
           <a:p>
             <a:fld id="{97DB9F38-7D6E-4546-A2F3-30228015AC1A}" type="datetimeFigureOut">
               <a:rPr lang="en-US" smtClean="0"/>
-              <a:t>1/27/2020</a:t>
+              <a:t>2/10/2020</a:t>
             </a:fld>
             <a:endParaRPr lang="en-US"/>
           </a:p>
@@ -2571,7 +2571,7 @@
           <a:p>
             <a:fld id="{97DB9F38-7D6E-4546-A2F3-30228015AC1A}" type="datetimeFigureOut">
               <a:rPr lang="en-US" smtClean="0"/>
-              <a:t>1/27/2020</a:t>
+              <a:t>2/10/2020</a:t>
             </a:fld>
             <a:endParaRPr lang="en-US"/>
           </a:p>
@@ -2823,7 +2823,7 @@
           <a:p>
             <a:fld id="{97DB9F38-7D6E-4546-A2F3-30228015AC1A}" type="datetimeFigureOut">
               <a:rPr lang="en-US" smtClean="0"/>
-              <a:t>1/27/2020</a:t>
+              <a:t>2/10/2020</a:t>
             </a:fld>
             <a:endParaRPr lang="en-US"/>
           </a:p>
@@ -3034,7 +3034,7 @@
           <a:p>
             <a:fld id="{97DB9F38-7D6E-4546-A2F3-30228015AC1A}" type="datetimeFigureOut">
               <a:rPr lang="en-US" smtClean="0"/>
-              <a:t>1/27/2020</a:t>
+              <a:t>2/10/2020</a:t>
             </a:fld>
             <a:endParaRPr lang="en-US"/>
           </a:p>
@@ -3457,8 +3457,12 @@
           <a:lstStyle/>
           <a:p>
             <a:r>
+              <a:rPr lang="en-US"/>
+              <a:t>February 10, </a:t>
+            </a:r>
+            <a:r>
               <a:rPr lang="en-US" dirty="0"/>
-              <a:t>January 27, 2020</a:t>
+              <a:t>2020</a:t>
             </a:r>
           </a:p>
           <a:p>

</xml_diff>

<commit_message>
Updates to slide decks.
</commit_message>
<xml_diff>
--- a/Installing Anaconda and Geopandas.pptx
+++ b/Installing Anaconda and Geopandas.pptx
@@ -206,7 +206,7 @@
           <a:p>
             <a:fld id="{0EB23849-656F-42CC-8750-7FDDA5785496}" type="datetimeFigureOut">
               <a:rPr lang="en-US" smtClean="0"/>
-              <a:t>2/10/2020</a:t>
+              <a:t>9/13/2020</a:t>
             </a:fld>
             <a:endParaRPr lang="en-US"/>
           </a:p>
@@ -732,7 +732,7 @@
           <a:p>
             <a:fld id="{97DB9F38-7D6E-4546-A2F3-30228015AC1A}" type="datetimeFigureOut">
               <a:rPr lang="en-US" smtClean="0"/>
-              <a:t>2/10/2020</a:t>
+              <a:t>9/13/2020</a:t>
             </a:fld>
             <a:endParaRPr lang="en-US"/>
           </a:p>
@@ -900,7 +900,7 @@
           <a:p>
             <a:fld id="{97DB9F38-7D6E-4546-A2F3-30228015AC1A}" type="datetimeFigureOut">
               <a:rPr lang="en-US" smtClean="0"/>
-              <a:t>2/10/2020</a:t>
+              <a:t>9/13/2020</a:t>
             </a:fld>
             <a:endParaRPr lang="en-US"/>
           </a:p>
@@ -1078,7 +1078,7 @@
           <a:p>
             <a:fld id="{97DB9F38-7D6E-4546-A2F3-30228015AC1A}" type="datetimeFigureOut">
               <a:rPr lang="en-US" smtClean="0"/>
-              <a:t>2/10/2020</a:t>
+              <a:t>9/13/2020</a:t>
             </a:fld>
             <a:endParaRPr lang="en-US"/>
           </a:p>
@@ -1246,7 +1246,7 @@
           <a:p>
             <a:fld id="{97DB9F38-7D6E-4546-A2F3-30228015AC1A}" type="datetimeFigureOut">
               <a:rPr lang="en-US" smtClean="0"/>
-              <a:t>2/10/2020</a:t>
+              <a:t>9/13/2020</a:t>
             </a:fld>
             <a:endParaRPr lang="en-US"/>
           </a:p>
@@ -1491,7 +1491,7 @@
           <a:p>
             <a:fld id="{97DB9F38-7D6E-4546-A2F3-30228015AC1A}" type="datetimeFigureOut">
               <a:rPr lang="en-US" smtClean="0"/>
-              <a:t>2/10/2020</a:t>
+              <a:t>9/13/2020</a:t>
             </a:fld>
             <a:endParaRPr lang="en-US"/>
           </a:p>
@@ -1720,7 +1720,7 @@
           <a:p>
             <a:fld id="{97DB9F38-7D6E-4546-A2F3-30228015AC1A}" type="datetimeFigureOut">
               <a:rPr lang="en-US" smtClean="0"/>
-              <a:t>2/10/2020</a:t>
+              <a:t>9/13/2020</a:t>
             </a:fld>
             <a:endParaRPr lang="en-US"/>
           </a:p>
@@ -2084,7 +2084,7 @@
           <a:p>
             <a:fld id="{97DB9F38-7D6E-4546-A2F3-30228015AC1A}" type="datetimeFigureOut">
               <a:rPr lang="en-US" smtClean="0"/>
-              <a:t>2/10/2020</a:t>
+              <a:t>9/13/2020</a:t>
             </a:fld>
             <a:endParaRPr lang="en-US"/>
           </a:p>
@@ -2201,7 +2201,7 @@
           <a:p>
             <a:fld id="{97DB9F38-7D6E-4546-A2F3-30228015AC1A}" type="datetimeFigureOut">
               <a:rPr lang="en-US" smtClean="0"/>
-              <a:t>2/10/2020</a:t>
+              <a:t>9/13/2020</a:t>
             </a:fld>
             <a:endParaRPr lang="en-US"/>
           </a:p>
@@ -2296,7 +2296,7 @@
           <a:p>
             <a:fld id="{97DB9F38-7D6E-4546-A2F3-30228015AC1A}" type="datetimeFigureOut">
               <a:rPr lang="en-US" smtClean="0"/>
-              <a:t>2/10/2020</a:t>
+              <a:t>9/13/2020</a:t>
             </a:fld>
             <a:endParaRPr lang="en-US"/>
           </a:p>
@@ -2571,7 +2571,7 @@
           <a:p>
             <a:fld id="{97DB9F38-7D6E-4546-A2F3-30228015AC1A}" type="datetimeFigureOut">
               <a:rPr lang="en-US" smtClean="0"/>
-              <a:t>2/10/2020</a:t>
+              <a:t>9/13/2020</a:t>
             </a:fld>
             <a:endParaRPr lang="en-US"/>
           </a:p>
@@ -2823,7 +2823,7 @@
           <a:p>
             <a:fld id="{97DB9F38-7D6E-4546-A2F3-30228015AC1A}" type="datetimeFigureOut">
               <a:rPr lang="en-US" smtClean="0"/>
-              <a:t>2/10/2020</a:t>
+              <a:t>9/13/2020</a:t>
             </a:fld>
             <a:endParaRPr lang="en-US"/>
           </a:p>
@@ -3034,7 +3034,7 @@
           <a:p>
             <a:fld id="{97DB9F38-7D6E-4546-A2F3-30228015AC1A}" type="datetimeFigureOut">
               <a:rPr lang="en-US" smtClean="0"/>
-              <a:t>2/10/2020</a:t>
+              <a:t>9/13/2020</a:t>
             </a:fld>
             <a:endParaRPr lang="en-US"/>
           </a:p>
@@ -3457,12 +3457,8 @@
           <a:lstStyle/>
           <a:p>
             <a:r>
-              <a:rPr lang="en-US"/>
-              <a:t>February 10, </a:t>
-            </a:r>
-            <a:r>
               <a:rPr lang="en-US" dirty="0"/>
-              <a:t>2020</a:t>
+              <a:t>September 13, 2020</a:t>
             </a:r>
           </a:p>
           <a:p>

</xml_diff>

<commit_message>
Updates to install slide deck
</commit_message>
<xml_diff>
--- a/Installing Anaconda and Geopandas.pptx
+++ b/Installing Anaconda and Geopandas.pptx
@@ -5,21 +5,20 @@
     <p:sldMasterId id="2147483648" r:id="rId1"/>
   </p:sldMasterIdLst>
   <p:notesMasterIdLst>
-    <p:notesMasterId r:id="rId14"/>
+    <p:notesMasterId r:id="rId13"/>
   </p:notesMasterIdLst>
   <p:sldIdLst>
     <p:sldId id="260" r:id="rId2"/>
     <p:sldId id="257" r:id="rId3"/>
     <p:sldId id="261" r:id="rId4"/>
     <p:sldId id="268" r:id="rId5"/>
-    <p:sldId id="263" r:id="rId6"/>
-    <p:sldId id="269" r:id="rId7"/>
-    <p:sldId id="264" r:id="rId8"/>
-    <p:sldId id="270" r:id="rId9"/>
-    <p:sldId id="271" r:id="rId10"/>
-    <p:sldId id="272" r:id="rId11"/>
-    <p:sldId id="274" r:id="rId12"/>
-    <p:sldId id="273" r:id="rId13"/>
+    <p:sldId id="269" r:id="rId6"/>
+    <p:sldId id="264" r:id="rId7"/>
+    <p:sldId id="270" r:id="rId8"/>
+    <p:sldId id="271" r:id="rId9"/>
+    <p:sldId id="272" r:id="rId10"/>
+    <p:sldId id="274" r:id="rId11"/>
+    <p:sldId id="273" r:id="rId12"/>
   </p:sldIdLst>
   <p:sldSz cx="12192000" cy="6858000"/>
   <p:notesSz cx="6858000" cy="9144000"/>
@@ -208,7 +207,7 @@
           <a:p>
             <a:fld id="{0EB23849-656F-42CC-8750-7FDDA5785496}" type="datetimeFigureOut">
               <a:rPr lang="en-US" smtClean="0"/>
-              <a:t>10/25/2020</a:t>
+              <a:t>11/2/2020</a:t>
             </a:fld>
             <a:endParaRPr lang="en-US"/>
           </a:p>
@@ -527,13 +526,7 @@
           <a:p>
             <a:r>
               <a:rPr lang="en-US" dirty="0"/>
-              <a:t>Notebook ~ 80 seconds</a:t>
-            </a:r>
-          </a:p>
-          <a:p>
-            <a:r>
-              <a:rPr lang="en-US" dirty="0"/>
-              <a:t>Matplotlib ~ 80 seconds</a:t>
+              <a:t>matplotlib ~ 80 seconds</a:t>
             </a:r>
           </a:p>
           <a:p>
@@ -559,13 +552,8 @@
             </a:r>
             <a:r>
               <a:rPr lang="en-US" dirty="0"/>
-              <a:t> ~ </a:t>
-            </a:r>
-            <a:r>
-              <a:rPr lang="en-US"/>
-              <a:t>240 seconds</a:t>
-            </a:r>
-            <a:endParaRPr lang="en-US" dirty="0"/>
+              <a:t> ~ 240 seconds</a:t>
+            </a:r>
           </a:p>
         </p:txBody>
       </p:sp>
@@ -734,7 +722,7 @@
           <a:p>
             <a:fld id="{97DB9F38-7D6E-4546-A2F3-30228015AC1A}" type="datetimeFigureOut">
               <a:rPr lang="en-US" smtClean="0"/>
-              <a:t>10/25/2020</a:t>
+              <a:t>11/2/2020</a:t>
             </a:fld>
             <a:endParaRPr lang="en-US"/>
           </a:p>
@@ -902,7 +890,7 @@
           <a:p>
             <a:fld id="{97DB9F38-7D6E-4546-A2F3-30228015AC1A}" type="datetimeFigureOut">
               <a:rPr lang="en-US" smtClean="0"/>
-              <a:t>10/25/2020</a:t>
+              <a:t>11/2/2020</a:t>
             </a:fld>
             <a:endParaRPr lang="en-US"/>
           </a:p>
@@ -1080,7 +1068,7 @@
           <a:p>
             <a:fld id="{97DB9F38-7D6E-4546-A2F3-30228015AC1A}" type="datetimeFigureOut">
               <a:rPr lang="en-US" smtClean="0"/>
-              <a:t>10/25/2020</a:t>
+              <a:t>11/2/2020</a:t>
             </a:fld>
             <a:endParaRPr lang="en-US"/>
           </a:p>
@@ -1248,7 +1236,7 @@
           <a:p>
             <a:fld id="{97DB9F38-7D6E-4546-A2F3-30228015AC1A}" type="datetimeFigureOut">
               <a:rPr lang="en-US" smtClean="0"/>
-              <a:t>10/25/2020</a:t>
+              <a:t>11/2/2020</a:t>
             </a:fld>
             <a:endParaRPr lang="en-US"/>
           </a:p>
@@ -1493,7 +1481,7 @@
           <a:p>
             <a:fld id="{97DB9F38-7D6E-4546-A2F3-30228015AC1A}" type="datetimeFigureOut">
               <a:rPr lang="en-US" smtClean="0"/>
-              <a:t>10/25/2020</a:t>
+              <a:t>11/2/2020</a:t>
             </a:fld>
             <a:endParaRPr lang="en-US"/>
           </a:p>
@@ -1722,7 +1710,7 @@
           <a:p>
             <a:fld id="{97DB9F38-7D6E-4546-A2F3-30228015AC1A}" type="datetimeFigureOut">
               <a:rPr lang="en-US" smtClean="0"/>
-              <a:t>10/25/2020</a:t>
+              <a:t>11/2/2020</a:t>
             </a:fld>
             <a:endParaRPr lang="en-US"/>
           </a:p>
@@ -2086,7 +2074,7 @@
           <a:p>
             <a:fld id="{97DB9F38-7D6E-4546-A2F3-30228015AC1A}" type="datetimeFigureOut">
               <a:rPr lang="en-US" smtClean="0"/>
-              <a:t>10/25/2020</a:t>
+              <a:t>11/2/2020</a:t>
             </a:fld>
             <a:endParaRPr lang="en-US"/>
           </a:p>
@@ -2203,7 +2191,7 @@
           <a:p>
             <a:fld id="{97DB9F38-7D6E-4546-A2F3-30228015AC1A}" type="datetimeFigureOut">
               <a:rPr lang="en-US" smtClean="0"/>
-              <a:t>10/25/2020</a:t>
+              <a:t>11/2/2020</a:t>
             </a:fld>
             <a:endParaRPr lang="en-US"/>
           </a:p>
@@ -2298,7 +2286,7 @@
           <a:p>
             <a:fld id="{97DB9F38-7D6E-4546-A2F3-30228015AC1A}" type="datetimeFigureOut">
               <a:rPr lang="en-US" smtClean="0"/>
-              <a:t>10/25/2020</a:t>
+              <a:t>11/2/2020</a:t>
             </a:fld>
             <a:endParaRPr lang="en-US"/>
           </a:p>
@@ -2573,7 +2561,7 @@
           <a:p>
             <a:fld id="{97DB9F38-7D6E-4546-A2F3-30228015AC1A}" type="datetimeFigureOut">
               <a:rPr lang="en-US" smtClean="0"/>
-              <a:t>10/25/2020</a:t>
+              <a:t>11/2/2020</a:t>
             </a:fld>
             <a:endParaRPr lang="en-US"/>
           </a:p>
@@ -2825,7 +2813,7 @@
           <a:p>
             <a:fld id="{97DB9F38-7D6E-4546-A2F3-30228015AC1A}" type="datetimeFigureOut">
               <a:rPr lang="en-US" smtClean="0"/>
-              <a:t>10/25/2020</a:t>
+              <a:t>11/2/2020</a:t>
             </a:fld>
             <a:endParaRPr lang="en-US"/>
           </a:p>
@@ -3036,7 +3024,7 @@
           <a:p>
             <a:fld id="{97DB9F38-7D6E-4546-A2F3-30228015AC1A}" type="datetimeFigureOut">
               <a:rPr lang="en-US" smtClean="0"/>
-              <a:t>10/25/2020</a:t>
+              <a:t>11/2/2020</a:t>
             </a:fld>
             <a:endParaRPr lang="en-US"/>
           </a:p>
@@ -3576,162 +3564,6 @@
           <p:cNvPr id="2" name="Title 1">
             <a:extLst>
               <a:ext uri="{FF2B5EF4-FFF2-40B4-BE49-F238E27FC236}">
-                <a16:creationId xmlns:a16="http://schemas.microsoft.com/office/drawing/2014/main" id="{18B3DD71-2E71-4C7F-946F-69EAEBADA8FC}"/>
-              </a:ext>
-            </a:extLst>
-          </p:cNvPr>
-          <p:cNvSpPr>
-            <a:spLocks noGrp="1"/>
-          </p:cNvSpPr>
-          <p:nvPr>
-            <p:ph type="title"/>
-          </p:nvPr>
-        </p:nvSpPr>
-        <p:spPr>
-          <a:xfrm>
-            <a:off x="838200" y="365125"/>
-            <a:ext cx="3873190" cy="1325563"/>
-          </a:xfrm>
-        </p:spPr>
-        <p:txBody>
-          <a:bodyPr>
-            <a:normAutofit/>
-          </a:bodyPr>
-          <a:lstStyle/>
-          <a:p>
-            <a:r>
-              <a:rPr lang="en-US" dirty="0"/>
-              <a:t>Install </a:t>
-            </a:r>
-            <a:r>
-              <a:rPr lang="en-US" dirty="0" err="1"/>
-              <a:t>geopandas</a:t>
-            </a:r>
-            <a:endParaRPr lang="en-US" dirty="0"/>
-          </a:p>
-        </p:txBody>
-      </p:sp>
-      <p:sp>
-        <p:nvSpPr>
-          <p:cNvPr id="3" name="Content Placeholder 2">
-            <a:extLst>
-              <a:ext uri="{FF2B5EF4-FFF2-40B4-BE49-F238E27FC236}">
-                <a16:creationId xmlns:a16="http://schemas.microsoft.com/office/drawing/2014/main" id="{66B8DA7B-6E52-4E18-92F5-84A19E236768}"/>
-              </a:ext>
-            </a:extLst>
-          </p:cNvPr>
-          <p:cNvSpPr>
-            <a:spLocks noGrp="1"/>
-          </p:cNvSpPr>
-          <p:nvPr>
-            <p:ph idx="1"/>
-          </p:nvPr>
-        </p:nvSpPr>
-        <p:spPr>
-          <a:xfrm>
-            <a:off x="4711390" y="505486"/>
-            <a:ext cx="7480610" cy="1185202"/>
-          </a:xfrm>
-        </p:spPr>
-        <p:txBody>
-          <a:bodyPr/>
-          <a:lstStyle/>
-          <a:p>
-            <a:r>
-              <a:rPr lang="en-US" dirty="0" err="1"/>
-              <a:t>conda</a:t>
-            </a:r>
-            <a:r>
-              <a:rPr lang="en-US" dirty="0"/>
-              <a:t> install </a:t>
-            </a:r>
-            <a:r>
-              <a:rPr lang="en-US" dirty="0" err="1"/>
-              <a:t>geopandas</a:t>
-            </a:r>
-            <a:endParaRPr lang="en-US" dirty="0"/>
-          </a:p>
-          <a:p>
-            <a:r>
-              <a:rPr lang="en-US" dirty="0"/>
-              <a:t>Press y to install dependencies when prompted</a:t>
-            </a:r>
-          </a:p>
-          <a:p>
-            <a:endParaRPr lang="en-US" dirty="0"/>
-          </a:p>
-        </p:txBody>
-      </p:sp>
-      <p:pic>
-        <p:nvPicPr>
-          <p:cNvPr id="7" name="Picture 6">
-            <a:extLst>
-              <a:ext uri="{FF2B5EF4-FFF2-40B4-BE49-F238E27FC236}">
-                <a16:creationId xmlns:a16="http://schemas.microsoft.com/office/drawing/2014/main" id="{A2DF7D93-94EA-4ED7-B743-A4369589CA24}"/>
-              </a:ext>
-            </a:extLst>
-          </p:cNvPr>
-          <p:cNvPicPr>
-            <a:picLocks noChangeAspect="1"/>
-          </p:cNvPicPr>
-          <p:nvPr/>
-        </p:nvPicPr>
-        <p:blipFill>
-          <a:blip r:embed="rId2">
-            <a:extLst>
-              <a:ext uri="{28A0092B-C50C-407E-A947-70E740481C1C}">
-                <a14:useLocalDpi xmlns:a14="http://schemas.microsoft.com/office/drawing/2010/main" val="0"/>
-              </a:ext>
-            </a:extLst>
-          </a:blip>
-          <a:srcRect/>
-          <a:stretch/>
-        </p:blipFill>
-        <p:spPr>
-          <a:xfrm>
-            <a:off x="838201" y="2047809"/>
-            <a:ext cx="9326275" cy="4803187"/>
-          </a:xfrm>
-          <a:prstGeom prst="rect">
-            <a:avLst/>
-          </a:prstGeom>
-        </p:spPr>
-      </p:pic>
-    </p:spTree>
-    <p:extLst>
-      <p:ext uri="{BB962C8B-B14F-4D97-AF65-F5344CB8AC3E}">
-        <p14:creationId xmlns:p14="http://schemas.microsoft.com/office/powerpoint/2010/main" val="685335989"/>
-      </p:ext>
-    </p:extLst>
-  </p:cSld>
-  <p:clrMapOvr>
-    <a:masterClrMapping/>
-  </p:clrMapOvr>
-</p:sld>
-</file>
-
-<file path=ppt/slides/slide11.xml><?xml version="1.0" encoding="utf-8"?>
-<p:sld xmlns:a="http://schemas.openxmlformats.org/drawingml/2006/main" xmlns:r="http://schemas.openxmlformats.org/officeDocument/2006/relationships" xmlns:p="http://schemas.openxmlformats.org/presentationml/2006/main">
-  <p:cSld>
-    <p:spTree>
-      <p:nvGrpSpPr>
-        <p:cNvPr id="1" name=""/>
-        <p:cNvGrpSpPr/>
-        <p:nvPr/>
-      </p:nvGrpSpPr>
-      <p:grpSpPr>
-        <a:xfrm>
-          <a:off x="0" y="0"/>
-          <a:ext cx="0" cy="0"/>
-          <a:chOff x="0" y="0"/>
-          <a:chExt cx="0" cy="0"/>
-        </a:xfrm>
-      </p:grpSpPr>
-      <p:sp>
-        <p:nvSpPr>
-          <p:cNvPr id="2" name="Title 1">
-            <a:extLst>
-              <a:ext uri="{FF2B5EF4-FFF2-40B4-BE49-F238E27FC236}">
                 <a16:creationId xmlns:a16="http://schemas.microsoft.com/office/drawing/2014/main" id="{C49A03C1-F52F-41DA-ADD0-4862AAE3FDCA}"/>
               </a:ext>
             </a:extLst>
@@ -3820,7 +3652,7 @@
 </p:sld>
 </file>
 
-<file path=ppt/slides/slide12.xml><?xml version="1.0" encoding="utf-8"?>
+<file path=ppt/slides/slide11.xml><?xml version="1.0" encoding="utf-8"?>
 <p:sld xmlns:a="http://schemas.openxmlformats.org/drawingml/2006/main" xmlns:r="http://schemas.openxmlformats.org/officeDocument/2006/relationships" xmlns:p="http://schemas.openxmlformats.org/presentationml/2006/main">
   <p:cSld>
     <p:spTree>
@@ -4032,7 +3864,7 @@
           <a:p>
             <a:r>
               <a:rPr lang="en-US" dirty="0"/>
-              <a:t>Make sure to select the Python 3.7, 64-bit, graphical installer version</a:t>
+              <a:t>Make sure to select the Python 3.8, 64-bit, graphical installer version</a:t>
             </a:r>
           </a:p>
           <a:p>
@@ -4137,15 +3969,7 @@
             </a:pPr>
             <a:r>
               <a:rPr lang="en-US" dirty="0"/>
-              <a:t>Create a new environment named ‘</a:t>
-            </a:r>
-            <a:r>
-              <a:rPr lang="en-US" dirty="0" err="1"/>
-              <a:t>intro_to_python</a:t>
-            </a:r>
-            <a:r>
-              <a:rPr lang="en-US" dirty="0"/>
-              <a:t>’</a:t>
+              <a:t>Launch Anaconda Navigator</a:t>
             </a:r>
           </a:p>
           <a:p>
@@ -4154,15 +3978,15 @@
             </a:pPr>
             <a:r>
               <a:rPr lang="en-US" dirty="0"/>
-              <a:t>Install </a:t>
+              <a:t>Create a new environment named ‘</a:t>
             </a:r>
             <a:r>
               <a:rPr lang="en-US" dirty="0" err="1"/>
-              <a:t>jupyter</a:t>
+              <a:t>intro_to_python</a:t>
             </a:r>
             <a:r>
               <a:rPr lang="en-US" dirty="0"/>
-              <a:t> notebook – interactive python</a:t>
+              <a:t>’</a:t>
             </a:r>
           </a:p>
           <a:p>
@@ -4413,167 +4237,6 @@
       </p:grpSpPr>
       <p:pic>
         <p:nvPicPr>
-          <p:cNvPr id="5" name="Picture 4" descr="A screenshot of a cell phone&#10;&#10;Description automatically generated">
-            <a:extLst>
-              <a:ext uri="{FF2B5EF4-FFF2-40B4-BE49-F238E27FC236}">
-                <a16:creationId xmlns:a16="http://schemas.microsoft.com/office/drawing/2014/main" id="{C1739C8C-FA1A-4571-9CC3-51EA910EFD5A}"/>
-              </a:ext>
-            </a:extLst>
-          </p:cNvPr>
-          <p:cNvPicPr>
-            <a:picLocks noChangeAspect="1"/>
-          </p:cNvPicPr>
-          <p:nvPr/>
-        </p:nvPicPr>
-        <p:blipFill>
-          <a:blip r:embed="rId2">
-            <a:extLst>
-              <a:ext uri="{28A0092B-C50C-407E-A947-70E740481C1C}">
-                <a14:useLocalDpi xmlns:a14="http://schemas.microsoft.com/office/drawing/2010/main" val="0"/>
-              </a:ext>
-            </a:extLst>
-          </a:blip>
-          <a:stretch>
-            <a:fillRect/>
-          </a:stretch>
-        </p:blipFill>
-        <p:spPr>
-          <a:xfrm>
-            <a:off x="0" y="0"/>
-            <a:ext cx="12192000" cy="6858000"/>
-          </a:xfrm>
-          <a:prstGeom prst="rect">
-            <a:avLst/>
-          </a:prstGeom>
-        </p:spPr>
-      </p:pic>
-      <p:sp>
-        <p:nvSpPr>
-          <p:cNvPr id="2" name="Title 1">
-            <a:extLst>
-              <a:ext uri="{FF2B5EF4-FFF2-40B4-BE49-F238E27FC236}">
-                <a16:creationId xmlns:a16="http://schemas.microsoft.com/office/drawing/2014/main" id="{F5347712-9E1E-47C0-885D-2073891A9B7A}"/>
-              </a:ext>
-            </a:extLst>
-          </p:cNvPr>
-          <p:cNvSpPr>
-            <a:spLocks noGrp="1"/>
-          </p:cNvSpPr>
-          <p:nvPr>
-            <p:ph type="title"/>
-          </p:nvPr>
-        </p:nvSpPr>
-        <p:spPr>
-          <a:xfrm>
-            <a:off x="2767361" y="153254"/>
-            <a:ext cx="8127380" cy="638485"/>
-          </a:xfrm>
-        </p:spPr>
-        <p:txBody>
-          <a:bodyPr>
-            <a:normAutofit fontScale="90000"/>
-          </a:bodyPr>
-          <a:lstStyle/>
-          <a:p>
-            <a:r>
-              <a:rPr lang="en-US" dirty="0"/>
-              <a:t>Install the </a:t>
-            </a:r>
-            <a:r>
-              <a:rPr lang="en-US" dirty="0" err="1"/>
-              <a:t>jupyter</a:t>
-            </a:r>
-            <a:r>
-              <a:rPr lang="en-US" dirty="0"/>
-              <a:t> notebook</a:t>
-            </a:r>
-          </a:p>
-        </p:txBody>
-      </p:sp>
-      <p:sp>
-        <p:nvSpPr>
-          <p:cNvPr id="6" name="Rectangle 5">
-            <a:extLst>
-              <a:ext uri="{FF2B5EF4-FFF2-40B4-BE49-F238E27FC236}">
-                <a16:creationId xmlns:a16="http://schemas.microsoft.com/office/drawing/2014/main" id="{73CC532B-8862-44AA-924B-41056BF5A79A}"/>
-              </a:ext>
-            </a:extLst>
-          </p:cNvPr>
-          <p:cNvSpPr/>
-          <p:nvPr/>
-        </p:nvSpPr>
-        <p:spPr>
-          <a:xfrm>
-            <a:off x="6956446" y="2579763"/>
-            <a:ext cx="468351" cy="390292"/>
-          </a:xfrm>
-          <a:prstGeom prst="rect">
-            <a:avLst/>
-          </a:prstGeom>
-          <a:noFill/>
-          <a:ln w="38100">
-            <a:solidFill>
-              <a:srgbClr val="C00000"/>
-            </a:solidFill>
-          </a:ln>
-        </p:spPr>
-        <p:style>
-          <a:lnRef idx="2">
-            <a:schemeClr val="accent1">
-              <a:shade val="50000"/>
-            </a:schemeClr>
-          </a:lnRef>
-          <a:fillRef idx="1">
-            <a:schemeClr val="accent1"/>
-          </a:fillRef>
-          <a:effectRef idx="0">
-            <a:schemeClr val="accent1"/>
-          </a:effectRef>
-          <a:fontRef idx="minor">
-            <a:schemeClr val="lt1"/>
-          </a:fontRef>
-        </p:style>
-        <p:txBody>
-          <a:bodyPr rtlCol="0" anchor="ctr"/>
-          <a:lstStyle/>
-          <a:p>
-            <a:pPr algn="ctr"/>
-            <a:endParaRPr lang="en-US"/>
-          </a:p>
-        </p:txBody>
-      </p:sp>
-    </p:spTree>
-    <p:extLst>
-      <p:ext uri="{BB962C8B-B14F-4D97-AF65-F5344CB8AC3E}">
-        <p14:creationId xmlns:p14="http://schemas.microsoft.com/office/powerpoint/2010/main" val="1145849357"/>
-      </p:ext>
-    </p:extLst>
-  </p:cSld>
-  <p:clrMapOvr>
-    <a:masterClrMapping/>
-  </p:clrMapOvr>
-</p:sld>
-</file>
-
-<file path=ppt/slides/slide6.xml><?xml version="1.0" encoding="utf-8"?>
-<p:sld xmlns:a="http://schemas.openxmlformats.org/drawingml/2006/main" xmlns:r="http://schemas.openxmlformats.org/officeDocument/2006/relationships" xmlns:p="http://schemas.openxmlformats.org/presentationml/2006/main">
-  <p:cSld>
-    <p:spTree>
-      <p:nvGrpSpPr>
-        <p:cNvPr id="1" name=""/>
-        <p:cNvGrpSpPr/>
-        <p:nvPr/>
-      </p:nvGrpSpPr>
-      <p:grpSpPr>
-        <a:xfrm>
-          <a:off x="0" y="0"/>
-          <a:ext cx="0" cy="0"/>
-          <a:chOff x="0" y="0"/>
-          <a:chExt cx="0" cy="0"/>
-        </a:xfrm>
-      </p:grpSpPr>
-      <p:pic>
-        <p:nvPicPr>
           <p:cNvPr id="4" name="Picture 3" descr="A screenshot of a computer&#10;&#10;Description automatically generated">
             <a:extLst>
               <a:ext uri="{FF2B5EF4-FFF2-40B4-BE49-F238E27FC236}">
@@ -4656,7 +4319,7 @@
 </p:sld>
 </file>
 
-<file path=ppt/slides/slide7.xml><?xml version="1.0" encoding="utf-8"?>
+<file path=ppt/slides/slide6.xml><?xml version="1.0" encoding="utf-8"?>
 <p:sld xmlns:a="http://schemas.openxmlformats.org/drawingml/2006/main" xmlns:r="http://schemas.openxmlformats.org/officeDocument/2006/relationships" xmlns:p="http://schemas.openxmlformats.org/presentationml/2006/main">
   <p:cSld>
     <p:spTree>
@@ -4796,7 +4459,7 @@
 </p:sld>
 </file>
 
-<file path=ppt/slides/slide8.xml><?xml version="1.0" encoding="utf-8"?>
+<file path=ppt/slides/slide7.xml><?xml version="1.0" encoding="utf-8"?>
 <p:sld xmlns:a="http://schemas.openxmlformats.org/drawingml/2006/main" xmlns:r="http://schemas.openxmlformats.org/officeDocument/2006/relationships" xmlns:p="http://schemas.openxmlformats.org/presentationml/2006/main">
   <p:cSld>
     <p:spTree>
@@ -4950,7 +4613,7 @@
 </p:sld>
 </file>
 
-<file path=ppt/slides/slide9.xml><?xml version="1.0" encoding="utf-8"?>
+<file path=ppt/slides/slide8.xml><?xml version="1.0" encoding="utf-8"?>
 <p:sld xmlns:a="http://schemas.openxmlformats.org/drawingml/2006/main" xmlns:r="http://schemas.openxmlformats.org/officeDocument/2006/relationships" xmlns:p="http://schemas.openxmlformats.org/presentationml/2006/main">
   <p:cSld>
     <p:spTree>
@@ -5097,6 +4760,162 @@
     <p:extLst>
       <p:ext uri="{BB962C8B-B14F-4D97-AF65-F5344CB8AC3E}">
         <p14:creationId xmlns:p14="http://schemas.microsoft.com/office/powerpoint/2010/main" val="346388870"/>
+      </p:ext>
+    </p:extLst>
+  </p:cSld>
+  <p:clrMapOvr>
+    <a:masterClrMapping/>
+  </p:clrMapOvr>
+</p:sld>
+</file>
+
+<file path=ppt/slides/slide9.xml><?xml version="1.0" encoding="utf-8"?>
+<p:sld xmlns:a="http://schemas.openxmlformats.org/drawingml/2006/main" xmlns:r="http://schemas.openxmlformats.org/officeDocument/2006/relationships" xmlns:p="http://schemas.openxmlformats.org/presentationml/2006/main">
+  <p:cSld>
+    <p:spTree>
+      <p:nvGrpSpPr>
+        <p:cNvPr id="1" name=""/>
+        <p:cNvGrpSpPr/>
+        <p:nvPr/>
+      </p:nvGrpSpPr>
+      <p:grpSpPr>
+        <a:xfrm>
+          <a:off x="0" y="0"/>
+          <a:ext cx="0" cy="0"/>
+          <a:chOff x="0" y="0"/>
+          <a:chExt cx="0" cy="0"/>
+        </a:xfrm>
+      </p:grpSpPr>
+      <p:sp>
+        <p:nvSpPr>
+          <p:cNvPr id="2" name="Title 1">
+            <a:extLst>
+              <a:ext uri="{FF2B5EF4-FFF2-40B4-BE49-F238E27FC236}">
+                <a16:creationId xmlns:a16="http://schemas.microsoft.com/office/drawing/2014/main" id="{18B3DD71-2E71-4C7F-946F-69EAEBADA8FC}"/>
+              </a:ext>
+            </a:extLst>
+          </p:cNvPr>
+          <p:cNvSpPr>
+            <a:spLocks noGrp="1"/>
+          </p:cNvSpPr>
+          <p:nvPr>
+            <p:ph type="title"/>
+          </p:nvPr>
+        </p:nvSpPr>
+        <p:spPr>
+          <a:xfrm>
+            <a:off x="838200" y="365125"/>
+            <a:ext cx="3873190" cy="1325563"/>
+          </a:xfrm>
+        </p:spPr>
+        <p:txBody>
+          <a:bodyPr>
+            <a:normAutofit/>
+          </a:bodyPr>
+          <a:lstStyle/>
+          <a:p>
+            <a:r>
+              <a:rPr lang="en-US" dirty="0"/>
+              <a:t>Install </a:t>
+            </a:r>
+            <a:r>
+              <a:rPr lang="en-US" dirty="0" err="1"/>
+              <a:t>geopandas</a:t>
+            </a:r>
+            <a:endParaRPr lang="en-US" dirty="0"/>
+          </a:p>
+        </p:txBody>
+      </p:sp>
+      <p:sp>
+        <p:nvSpPr>
+          <p:cNvPr id="3" name="Content Placeholder 2">
+            <a:extLst>
+              <a:ext uri="{FF2B5EF4-FFF2-40B4-BE49-F238E27FC236}">
+                <a16:creationId xmlns:a16="http://schemas.microsoft.com/office/drawing/2014/main" id="{66B8DA7B-6E52-4E18-92F5-84A19E236768}"/>
+              </a:ext>
+            </a:extLst>
+          </p:cNvPr>
+          <p:cNvSpPr>
+            <a:spLocks noGrp="1"/>
+          </p:cNvSpPr>
+          <p:nvPr>
+            <p:ph idx="1"/>
+          </p:nvPr>
+        </p:nvSpPr>
+        <p:spPr>
+          <a:xfrm>
+            <a:off x="4711390" y="505486"/>
+            <a:ext cx="7480610" cy="1185202"/>
+          </a:xfrm>
+        </p:spPr>
+        <p:txBody>
+          <a:bodyPr/>
+          <a:lstStyle/>
+          <a:p>
+            <a:r>
+              <a:rPr lang="en-US" dirty="0" err="1"/>
+              <a:t>conda</a:t>
+            </a:r>
+            <a:r>
+              <a:rPr lang="en-US" dirty="0"/>
+              <a:t> install </a:t>
+            </a:r>
+            <a:r>
+              <a:rPr lang="en-US" dirty="0" err="1"/>
+              <a:t>geopandas</a:t>
+            </a:r>
+            <a:endParaRPr lang="en-US" dirty="0"/>
+          </a:p>
+          <a:p>
+            <a:r>
+              <a:rPr lang="en-US" dirty="0"/>
+              <a:t>Press y to install dependencies when prompted</a:t>
+            </a:r>
+          </a:p>
+          <a:p>
+            <a:endParaRPr lang="en-US" dirty="0"/>
+          </a:p>
+        </p:txBody>
+      </p:sp>
+      <p:pic>
+        <p:nvPicPr>
+          <p:cNvPr id="7" name="Picture 6">
+            <a:extLst>
+              <a:ext uri="{FF2B5EF4-FFF2-40B4-BE49-F238E27FC236}">
+                <a16:creationId xmlns:a16="http://schemas.microsoft.com/office/drawing/2014/main" id="{A2DF7D93-94EA-4ED7-B743-A4369589CA24}"/>
+              </a:ext>
+            </a:extLst>
+          </p:cNvPr>
+          <p:cNvPicPr>
+            <a:picLocks noChangeAspect="1"/>
+          </p:cNvPicPr>
+          <p:nvPr/>
+        </p:nvPicPr>
+        <p:blipFill>
+          <a:blip r:embed="rId2">
+            <a:extLst>
+              <a:ext uri="{28A0092B-C50C-407E-A947-70E740481C1C}">
+                <a14:useLocalDpi xmlns:a14="http://schemas.microsoft.com/office/drawing/2010/main" val="0"/>
+              </a:ext>
+            </a:extLst>
+          </a:blip>
+          <a:srcRect/>
+          <a:stretch/>
+        </p:blipFill>
+        <p:spPr>
+          <a:xfrm>
+            <a:off x="838201" y="2047809"/>
+            <a:ext cx="9326275" cy="4803187"/>
+          </a:xfrm>
+          <a:prstGeom prst="rect">
+            <a:avLst/>
+          </a:prstGeom>
+        </p:spPr>
+      </p:pic>
+    </p:spTree>
+    <p:extLst>
+      <p:ext uri="{BB962C8B-B14F-4D97-AF65-F5344CB8AC3E}">
+        <p14:creationId xmlns:p14="http://schemas.microsoft.com/office/powerpoint/2010/main" val="685335989"/>
       </p:ext>
     </p:extLst>
   </p:cSld>

</xml_diff>